<commit_message>
Mise à jour du ppt
</commit_message>
<xml_diff>
--- a/présentation_orsys.pptx
+++ b/présentation_orsys.pptx
@@ -5,10 +5,10 @@
     <p:sldMasterId id="2147483648" r:id="rId1"/>
   </p:sldMasterIdLst>
   <p:notesMasterIdLst>
-    <p:notesMasterId r:id="rId21"/>
+    <p:notesMasterId r:id="rId20"/>
   </p:notesMasterIdLst>
   <p:handoutMasterIdLst>
-    <p:handoutMasterId r:id="rId22"/>
+    <p:handoutMasterId r:id="rId21"/>
   </p:handoutMasterIdLst>
   <p:sldIdLst>
     <p:sldId id="256" r:id="rId2"/>
@@ -17,19 +17,18 @@
     <p:sldId id="258" r:id="rId5"/>
     <p:sldId id="261" r:id="rId6"/>
     <p:sldId id="260" r:id="rId7"/>
-    <p:sldId id="264" r:id="rId8"/>
-    <p:sldId id="262" r:id="rId9"/>
+    <p:sldId id="262" r:id="rId8"/>
+    <p:sldId id="264" r:id="rId9"/>
     <p:sldId id="265" r:id="rId10"/>
-    <p:sldId id="266" r:id="rId11"/>
-    <p:sldId id="275" r:id="rId12"/>
-    <p:sldId id="276" r:id="rId13"/>
-    <p:sldId id="267" r:id="rId14"/>
-    <p:sldId id="268" r:id="rId15"/>
-    <p:sldId id="269" r:id="rId16"/>
-    <p:sldId id="273" r:id="rId17"/>
-    <p:sldId id="270" r:id="rId18"/>
-    <p:sldId id="271" r:id="rId19"/>
-    <p:sldId id="272" r:id="rId20"/>
+    <p:sldId id="275" r:id="rId11"/>
+    <p:sldId id="276" r:id="rId12"/>
+    <p:sldId id="267" r:id="rId13"/>
+    <p:sldId id="268" r:id="rId14"/>
+    <p:sldId id="269" r:id="rId15"/>
+    <p:sldId id="273" r:id="rId16"/>
+    <p:sldId id="270" r:id="rId17"/>
+    <p:sldId id="271" r:id="rId18"/>
+    <p:sldId id="272" r:id="rId19"/>
   </p:sldIdLst>
   <p:sldSz cx="12192000" cy="6858000"/>
   <p:notesSz cx="6858000" cy="9144000"/>
@@ -130,10 +129,10 @@
   </p:defaultTextStyle>
   <p:extLst>
     <p:ext uri="{EFAFB233-063F-42B5-8137-9DF3F51BA10A}">
-      <p15:sldGuideLst xmlns:p15="http://schemas.microsoft.com/office/powerpoint/2012/main" xmlns=""/>
+      <p15:sldGuideLst xmlns="" xmlns:p15="http://schemas.microsoft.com/office/powerpoint/2012/main"/>
     </p:ext>
     <p:ext uri="{2D200454-40CA-4A62-9FC3-DE9A4176ACB9}">
-      <p15:notesGuideLst xmlns:p15="http://schemas.microsoft.com/office/powerpoint/2012/main" xmlns=""/>
+      <p15:notesGuideLst xmlns="" xmlns:p15="http://schemas.microsoft.com/office/powerpoint/2012/main"/>
     </p:ext>
   </p:extLst>
 </p:presentation>
@@ -175,7 +174,7 @@
           <p:cNvPr id="2" name="Espace réservé de l'en-tête 1">
             <a:extLst>
               <a:ext uri="{FF2B5EF4-FFF2-40B4-BE49-F238E27FC236}">
-                <a16:creationId xmlns:a16="http://schemas.microsoft.com/office/drawing/2014/main" xmlns="" id="{0669A63A-7243-43A0-B0D2-A0322F7ADA49}"/>
+                <a16:creationId xmlns="" xmlns:a16="http://schemas.microsoft.com/office/drawing/2014/main" id="{0669A63A-7243-43A0-B0D2-A0322F7ADA49}"/>
               </a:ext>
             </a:extLst>
           </p:cNvPr>
@@ -212,7 +211,7 @@
           <p:cNvPr id="3" name="Espace réservé de la date 2">
             <a:extLst>
               <a:ext uri="{FF2B5EF4-FFF2-40B4-BE49-F238E27FC236}">
-                <a16:creationId xmlns:a16="http://schemas.microsoft.com/office/drawing/2014/main" xmlns="" id="{CF63D0D6-1F39-4ED9-AA68-D36D6D0B6278}"/>
+                <a16:creationId xmlns="" xmlns:a16="http://schemas.microsoft.com/office/drawing/2014/main" id="{CF63D0D6-1F39-4ED9-AA68-D36D6D0B6278}"/>
               </a:ext>
             </a:extLst>
           </p:cNvPr>
@@ -242,7 +241,7 @@
           <a:p>
             <a:fld id="{ECB630AF-4A22-442B-A90C-CF8A5596C07A}" type="datetime1">
               <a:rPr lang="fr-FR" smtClean="0"/>
-              <a:t>21/02/2022</a:t>
+              <a:t>22/02/2022</a:t>
             </a:fld>
             <a:endParaRPr lang="fr-FR" dirty="0"/>
           </a:p>
@@ -253,7 +252,7 @@
           <p:cNvPr id="4" name="Espace réservé du pied de page 3">
             <a:extLst>
               <a:ext uri="{FF2B5EF4-FFF2-40B4-BE49-F238E27FC236}">
-                <a16:creationId xmlns:a16="http://schemas.microsoft.com/office/drawing/2014/main" xmlns="" id="{45D0D389-31C2-4F3F-8C86-A9FC85FA12EF}"/>
+                <a16:creationId xmlns="" xmlns:a16="http://schemas.microsoft.com/office/drawing/2014/main" id="{45D0D389-31C2-4F3F-8C86-A9FC85FA12EF}"/>
               </a:ext>
             </a:extLst>
           </p:cNvPr>
@@ -290,7 +289,7 @@
           <p:cNvPr id="5" name="Espace réservé du numéro de diapositive 4">
             <a:extLst>
               <a:ext uri="{FF2B5EF4-FFF2-40B4-BE49-F238E27FC236}">
-                <a16:creationId xmlns:a16="http://schemas.microsoft.com/office/drawing/2014/main" xmlns="" id="{5A237D49-08AC-4133-B71B-123DFD1BBAA4}"/>
+                <a16:creationId xmlns="" xmlns:a16="http://schemas.microsoft.com/office/drawing/2014/main" id="{5A237D49-08AC-4133-B71B-123DFD1BBAA4}"/>
               </a:ext>
             </a:extLst>
           </p:cNvPr>
@@ -421,7 +420,7 @@
             <a:fld id="{A942032E-1DA1-4EB9-8EAC-82ECCBFFB3BF}" type="datetime1">
               <a:rPr lang="fr-FR" smtClean="0"/>
               <a:pPr/>
-              <a:t>21/02/2022</a:t>
+              <a:t>22/02/2022</a:t>
             </a:fld>
             <a:endParaRPr lang="fr-FR" dirty="0"/>
           </a:p>
@@ -5050,7 +5049,7 @@
             <a:pPr rtl="0"/>
             <a:fld id="{CF08D668-4BC0-4CDB-9B86-DE682481DFF9}" type="datetime1">
               <a:rPr lang="fr-FR" noProof="0" smtClean="0"/>
-              <a:t>21/02/2022</a:t>
+              <a:t>22/02/2022</a:t>
             </a:fld>
             <a:endParaRPr lang="fr-FR" noProof="0"/>
           </a:p>
@@ -5314,7 +5313,7 @@
             <a:pPr rtl="0"/>
             <a:fld id="{042A2F9B-B86E-43F2-B18A-D15C606BA300}" type="datetime1">
               <a:rPr lang="fr-FR" noProof="0" smtClean="0"/>
-              <a:t>21/02/2022</a:t>
+              <a:t>22/02/2022</a:t>
             </a:fld>
             <a:endParaRPr lang="fr-FR" noProof="0"/>
           </a:p>
@@ -5508,7 +5507,7 @@
             <a:pPr rtl="0"/>
             <a:fld id="{EDF4344E-2C8A-4FC4-815A-156BDBB794F2}" type="datetime1">
               <a:rPr lang="fr-FR" noProof="0" smtClean="0"/>
-              <a:t>21/02/2022</a:t>
+              <a:t>22/02/2022</a:t>
             </a:fld>
             <a:endParaRPr lang="fr-FR" noProof="0"/>
           </a:p>
@@ -5769,7 +5768,7 @@
             <a:pPr rtl="0"/>
             <a:fld id="{FE9E2943-6345-49E8-B783-0A66EF9421BF}" type="datetime1">
               <a:rPr lang="fr-FR" noProof="0" smtClean="0"/>
-              <a:t>21/02/2022</a:t>
+              <a:t>22/02/2022</a:t>
             </a:fld>
             <a:endParaRPr lang="fr-FR" noProof="0"/>
           </a:p>
@@ -6201,7 +6200,7 @@
             <a:pPr rtl="0"/>
             <a:fld id="{E773B138-4BC2-48EB-B6B5-1F9010E477D6}" type="datetime1">
               <a:rPr lang="fr-FR" noProof="0" smtClean="0"/>
-              <a:t>21/02/2022</a:t>
+              <a:t>22/02/2022</a:t>
             </a:fld>
             <a:endParaRPr lang="fr-FR" noProof="0"/>
           </a:p>
@@ -6745,7 +6744,7 @@
             <a:pPr rtl="0"/>
             <a:fld id="{B4C8AC54-47E8-455F-B946-6C2146701BCA}" type="datetime1">
               <a:rPr lang="fr-FR" noProof="0" smtClean="0"/>
-              <a:t>21/02/2022</a:t>
+              <a:t>22/02/2022</a:t>
             </a:fld>
             <a:endParaRPr lang="fr-FR" noProof="0"/>
           </a:p>
@@ -7460,7 +7459,7 @@
             <a:pPr rtl="0"/>
             <a:fld id="{8B02EE67-FF17-4DF0-9829-ED602516B6AB}" type="datetime1">
               <a:rPr lang="fr-FR" noProof="0" smtClean="0"/>
-              <a:t>21/02/2022</a:t>
+              <a:t>22/02/2022</a:t>
             </a:fld>
             <a:endParaRPr lang="fr-FR" noProof="0"/>
           </a:p>
@@ -7627,7 +7626,7 @@
             <a:pPr rtl="0"/>
             <a:fld id="{CB00739E-7E62-4E1D-904B-086EE85DD8B1}" type="datetime1">
               <a:rPr lang="fr-FR" noProof="0" smtClean="0"/>
-              <a:t>21/02/2022</a:t>
+              <a:t>22/02/2022</a:t>
             </a:fld>
             <a:endParaRPr lang="fr-FR" noProof="0"/>
           </a:p>
@@ -7804,7 +7803,7 @@
             <a:pPr rtl="0"/>
             <a:fld id="{3AEC66CD-B356-4D5C-AD50-6BD69D931936}" type="datetime1">
               <a:rPr lang="fr-FR" noProof="0" smtClean="0"/>
-              <a:t>21/02/2022</a:t>
+              <a:t>22/02/2022</a:t>
             </a:fld>
             <a:endParaRPr lang="fr-FR" noProof="0"/>
           </a:p>
@@ -7971,7 +7970,7 @@
             <a:pPr rtl="0"/>
             <a:fld id="{BC35E71B-828B-42B2-8FFF-8F54F3728D31}" type="datetime1">
               <a:rPr lang="fr-FR" noProof="0" smtClean="0"/>
-              <a:t>21/02/2022</a:t>
+              <a:t>22/02/2022</a:t>
             </a:fld>
             <a:endParaRPr lang="fr-FR" noProof="0"/>
           </a:p>
@@ -8219,7 +8218,7 @@
             <a:pPr rtl="0"/>
             <a:fld id="{4D978BD7-C93B-4C81-8808-0602EEAA0D4F}" type="datetime1">
               <a:rPr lang="fr-FR" noProof="0" smtClean="0"/>
-              <a:t>21/02/2022</a:t>
+              <a:t>22/02/2022</a:t>
             </a:fld>
             <a:endParaRPr lang="fr-FR" noProof="0"/>
           </a:p>
@@ -8447,7 +8446,7 @@
             <a:pPr rtl="0"/>
             <a:fld id="{239D595D-8C95-4E32-87C5-13737C68A710}" type="datetime1">
               <a:rPr lang="fr-FR" noProof="0" smtClean="0"/>
-              <a:t>21/02/2022</a:t>
+              <a:t>22/02/2022</a:t>
             </a:fld>
             <a:endParaRPr lang="fr-FR" noProof="0"/>
           </a:p>
@@ -8824,7 +8823,7 @@
             <a:pPr rtl="0"/>
             <a:fld id="{84DA759D-04B2-44BC-90BE-4B87CBA3108B}" type="datetime1">
               <a:rPr lang="fr-FR" noProof="0" smtClean="0"/>
-              <a:t>21/02/2022</a:t>
+              <a:t>22/02/2022</a:t>
             </a:fld>
             <a:endParaRPr lang="fr-FR" noProof="0"/>
           </a:p>
@@ -8940,7 +8939,7 @@
             <a:pPr rtl="0"/>
             <a:fld id="{6A1026B5-A485-46D6-AB07-2FC62B781980}" type="datetime1">
               <a:rPr lang="fr-FR" noProof="0" smtClean="0"/>
-              <a:t>21/02/2022</a:t>
+              <a:t>22/02/2022</a:t>
             </a:fld>
             <a:endParaRPr lang="fr-FR" noProof="0"/>
           </a:p>
@@ -9033,7 +9032,7 @@
             <a:pPr rtl="0"/>
             <a:fld id="{EF0F356B-B2AC-4095-9654-914AF32EFF7B}" type="datetime1">
               <a:rPr lang="fr-FR" noProof="0" smtClean="0"/>
-              <a:t>21/02/2022</a:t>
+              <a:t>22/02/2022</a:t>
             </a:fld>
             <a:endParaRPr lang="fr-FR" noProof="0"/>
           </a:p>
@@ -9279,7 +9278,7 @@
             <a:pPr rtl="0"/>
             <a:fld id="{194F51B8-F97F-4B39-9088-1B1A9605BAAD}" type="datetime1">
               <a:rPr lang="fr-FR" noProof="0" smtClean="0"/>
-              <a:t>21/02/2022</a:t>
+              <a:t>22/02/2022</a:t>
             </a:fld>
             <a:endParaRPr lang="fr-FR" noProof="0"/>
           </a:p>
@@ -9557,7 +9556,7 @@
             <a:pPr rtl="0"/>
             <a:fld id="{2632467C-5233-4442-B487-3C3607DDD274}" type="datetime1">
               <a:rPr lang="fr-FR" noProof="0" smtClean="0"/>
-              <a:t>21/02/2022</a:t>
+              <a:t>22/02/2022</a:t>
             </a:fld>
             <a:endParaRPr lang="fr-FR" noProof="0"/>
           </a:p>
@@ -12632,7 +12631,7 @@
             <a:pPr rtl="0"/>
             <a:fld id="{0606F074-D86C-47E3-B58D-F95F5D2B8846}" type="datetime1">
               <a:rPr lang="fr-FR" noProof="0" smtClean="0"/>
-              <a:t>21/02/2022</a:t>
+              <a:t>22/02/2022</a:t>
             </a:fld>
             <a:endParaRPr lang="fr-FR" noProof="0" dirty="0"/>
           </a:p>
@@ -13168,7 +13167,7 @@
           <p:cNvPr id="4" name="ZoneTexte 3">
             <a:extLst>
               <a:ext uri="{FF2B5EF4-FFF2-40B4-BE49-F238E27FC236}">
-                <a16:creationId xmlns:a16="http://schemas.microsoft.com/office/drawing/2014/main" xmlns="" id="{FD0FC033-ECF5-447B-8474-4AE203F2D9E1}"/>
+                <a16:creationId xmlns="" xmlns:a16="http://schemas.microsoft.com/office/drawing/2014/main" id="{FD0FC033-ECF5-447B-8474-4AE203F2D9E1}"/>
               </a:ext>
             </a:extLst>
           </p:cNvPr>
@@ -13251,7 +13250,7 @@
           <p:cNvPr id="2" name="Titre 1">
             <a:extLst>
               <a:ext uri="{FF2B5EF4-FFF2-40B4-BE49-F238E27FC236}">
-                <a16:creationId xmlns:a16="http://schemas.microsoft.com/office/drawing/2014/main" xmlns="" id="{ECC9877D-010A-4AE8-A590-5DB6D61E307D}"/>
+                <a16:creationId xmlns="" xmlns:a16="http://schemas.microsoft.com/office/drawing/2014/main" id="{ECC9877D-010A-4AE8-A590-5DB6D61E307D}"/>
               </a:ext>
             </a:extLst>
           </p:cNvPr>
@@ -13279,603 +13278,7 @@
           <p:cNvPr id="5" name="ZoneTexte 4">
             <a:extLst>
               <a:ext uri="{FF2B5EF4-FFF2-40B4-BE49-F238E27FC236}">
-                <a16:creationId xmlns:a16="http://schemas.microsoft.com/office/drawing/2014/main" xmlns="" id="{2D737C13-863C-4CEF-B304-BA892E0A1FF9}"/>
-              </a:ext>
-            </a:extLst>
-          </p:cNvPr>
-          <p:cNvSpPr txBox="1"/>
-          <p:nvPr/>
-        </p:nvSpPr>
-        <p:spPr>
-          <a:xfrm>
-            <a:off x="3737494" y="1670839"/>
-            <a:ext cx="4721296" cy="477054"/>
-          </a:xfrm>
-          <a:prstGeom prst="rect">
-            <a:avLst/>
-          </a:prstGeom>
-          <a:noFill/>
-        </p:spPr>
-        <p:txBody>
-          <a:bodyPr rot="0" spcFirstLastPara="0" vertOverflow="overflow" horzOverflow="overflow" vert="horz" wrap="square" lIns="91440" tIns="45720" rIns="91440" bIns="45720" numCol="1" spcCol="0" rtlCol="0" fromWordArt="0" anchor="t" anchorCtr="0" forceAA="0" compatLnSpc="1">
-            <a:prstTxWarp prst="textNoShape">
-              <a:avLst/>
-            </a:prstTxWarp>
-            <a:spAutoFit/>
-          </a:bodyPr>
-          <a:lstStyle/>
-          <a:p>
-            <a:r>
-              <a:rPr lang="fr-FR" sz="2500" dirty="0"/>
-              <a:t>La liste des jeux </a:t>
-            </a:r>
-            <a:r>
-              <a:rPr lang="fr-FR" sz="2500" dirty="0" err="1"/>
-              <a:t>Front-End</a:t>
-            </a:r>
-          </a:p>
-        </p:txBody>
-      </p:sp>
-      <p:pic>
-        <p:nvPicPr>
-          <p:cNvPr id="3" name="Image 5">
-            <a:extLst>
-              <a:ext uri="{FF2B5EF4-FFF2-40B4-BE49-F238E27FC236}">
-                <a16:creationId xmlns:a16="http://schemas.microsoft.com/office/drawing/2014/main" xmlns="" id="{F9CD578C-6564-4AFC-AE85-B9BFAF316CF0}"/>
-              </a:ext>
-            </a:extLst>
-          </p:cNvPr>
-          <p:cNvPicPr>
-            <a:picLocks noGrp="1" noChangeAspect="1"/>
-          </p:cNvPicPr>
-          <p:nvPr>
-            <p:ph idx="1"/>
-          </p:nvPr>
-        </p:nvPicPr>
-        <p:blipFill>
-          <a:blip r:embed="rId2"/>
-          <a:stretch>
-            <a:fillRect/>
-          </a:stretch>
-        </p:blipFill>
-        <p:spPr>
-          <a:xfrm>
-            <a:off x="7469952" y="5159904"/>
-            <a:ext cx="2826335" cy="1425048"/>
-          </a:xfrm>
-        </p:spPr>
-      </p:pic>
-      <p:pic>
-        <p:nvPicPr>
-          <p:cNvPr id="6" name="Image 6" descr="Une image contenant table&#10;&#10;Description générée automatiquement">
-            <a:extLst>
-              <a:ext uri="{FF2B5EF4-FFF2-40B4-BE49-F238E27FC236}">
-                <a16:creationId xmlns:a16="http://schemas.microsoft.com/office/drawing/2014/main" xmlns="" id="{851106C3-25F5-4E1F-832A-2E11F2940423}"/>
-              </a:ext>
-            </a:extLst>
-          </p:cNvPr>
-          <p:cNvPicPr>
-            <a:picLocks noChangeAspect="1"/>
-          </p:cNvPicPr>
-          <p:nvPr/>
-        </p:nvPicPr>
-        <p:blipFill>
-          <a:blip r:embed="rId3"/>
-          <a:stretch>
-            <a:fillRect/>
-          </a:stretch>
-        </p:blipFill>
-        <p:spPr>
-          <a:xfrm>
-            <a:off x="480482" y="5438116"/>
-            <a:ext cx="3113617" cy="807769"/>
-          </a:xfrm>
-          <a:prstGeom prst="rect">
-            <a:avLst/>
-          </a:prstGeom>
-        </p:spPr>
-      </p:pic>
-      <p:sp>
-        <p:nvSpPr>
-          <p:cNvPr id="9" name="ZoneTexte 8">
-            <a:extLst>
-              <a:ext uri="{FF2B5EF4-FFF2-40B4-BE49-F238E27FC236}">
-                <a16:creationId xmlns:a16="http://schemas.microsoft.com/office/drawing/2014/main" xmlns="" id="{41E68817-D034-44A0-934C-51116CFD435F}"/>
-              </a:ext>
-            </a:extLst>
-          </p:cNvPr>
-          <p:cNvSpPr txBox="1"/>
-          <p:nvPr/>
-        </p:nvSpPr>
-        <p:spPr>
-          <a:xfrm>
-            <a:off x="3083983" y="2946400"/>
-            <a:ext cx="806450" cy="369332"/>
-          </a:xfrm>
-          <a:prstGeom prst="rect">
-            <a:avLst/>
-          </a:prstGeom>
-          <a:noFill/>
-        </p:spPr>
-        <p:txBody>
-          <a:bodyPr rot="0" spcFirstLastPara="0" vertOverflow="overflow" horzOverflow="overflow" vert="horz" wrap="square" lIns="91440" tIns="45720" rIns="91440" bIns="45720" numCol="1" spcCol="0" rtlCol="0" fromWordArt="0" anchor="t" anchorCtr="0" forceAA="0" compatLnSpc="1">
-            <a:prstTxWarp prst="textNoShape">
-              <a:avLst/>
-            </a:prstTxWarp>
-            <a:spAutoFit/>
-          </a:bodyPr>
-          <a:lstStyle/>
-          <a:p>
-            <a:pPr algn="l"/>
-            <a:r>
-              <a:rPr lang="fr-FR" dirty="0"/>
-              <a:t>Game</a:t>
-            </a:r>
-          </a:p>
-        </p:txBody>
-      </p:sp>
-      <p:sp>
-        <p:nvSpPr>
-          <p:cNvPr id="13" name="ZoneTexte 12">
-            <a:extLst>
-              <a:ext uri="{FF2B5EF4-FFF2-40B4-BE49-F238E27FC236}">
-                <a16:creationId xmlns:a16="http://schemas.microsoft.com/office/drawing/2014/main" xmlns="" id="{8148EE50-C85C-421E-A93A-AAF0B44C0E42}"/>
-              </a:ext>
-            </a:extLst>
-          </p:cNvPr>
-          <p:cNvSpPr txBox="1"/>
-          <p:nvPr/>
-        </p:nvSpPr>
-        <p:spPr>
-          <a:xfrm>
-            <a:off x="6692900" y="3285068"/>
-            <a:ext cx="1642533" cy="369332"/>
-          </a:xfrm>
-          <a:prstGeom prst="rect">
-            <a:avLst/>
-          </a:prstGeom>
-          <a:noFill/>
-        </p:spPr>
-        <p:txBody>
-          <a:bodyPr rot="0" spcFirstLastPara="0" vertOverflow="overflow" horzOverflow="overflow" vert="horz" wrap="square" lIns="91440" tIns="45720" rIns="91440" bIns="45720" numCol="1" spcCol="0" rtlCol="0" fromWordArt="0" anchor="t" anchorCtr="0" forceAA="0" compatLnSpc="1">
-            <a:prstTxWarp prst="textNoShape">
-              <a:avLst/>
-            </a:prstTxWarp>
-            <a:spAutoFit/>
-          </a:bodyPr>
-          <a:lstStyle/>
-          <a:p>
-            <a:r>
-              <a:rPr lang="fr-FR" dirty="0" err="1"/>
-              <a:t>GameDto</a:t>
-            </a:r>
-          </a:p>
-        </p:txBody>
-      </p:sp>
-      <p:cxnSp>
-        <p:nvCxnSpPr>
-          <p:cNvPr id="19" name="Connecteur : en angle 18">
-            <a:extLst>
-              <a:ext uri="{FF2B5EF4-FFF2-40B4-BE49-F238E27FC236}">
-                <a16:creationId xmlns:a16="http://schemas.microsoft.com/office/drawing/2014/main" xmlns="" id="{1073A71E-9C96-4A42-882F-8A3F8CF43A11}"/>
-              </a:ext>
-            </a:extLst>
-          </p:cNvPr>
-          <p:cNvCxnSpPr/>
-          <p:nvPr/>
-        </p:nvCxnSpPr>
-        <p:spPr>
-          <a:xfrm flipV="1">
-            <a:off x="4649259" y="3468159"/>
-            <a:ext cx="2004483" cy="408516"/>
-          </a:xfrm>
-          <a:prstGeom prst="bentConnector3">
-            <a:avLst/>
-          </a:prstGeom>
-          <a:ln>
-            <a:headEnd type="triangle"/>
-            <a:tailEnd type="triangle"/>
-          </a:ln>
-        </p:spPr>
-        <p:style>
-          <a:lnRef idx="1">
-            <a:schemeClr val="accent1"/>
-          </a:lnRef>
-          <a:fillRef idx="0">
-            <a:schemeClr val="accent1"/>
-          </a:fillRef>
-          <a:effectRef idx="0">
-            <a:schemeClr val="accent1"/>
-          </a:effectRef>
-          <a:fontRef idx="minor">
-            <a:schemeClr val="tx1"/>
-          </a:fontRef>
-        </p:style>
-      </p:cxnSp>
-      <p:cxnSp>
-        <p:nvCxnSpPr>
-          <p:cNvPr id="21" name="Connecteur droit avec flèche 20">
-            <a:extLst>
-              <a:ext uri="{FF2B5EF4-FFF2-40B4-BE49-F238E27FC236}">
-                <a16:creationId xmlns:a16="http://schemas.microsoft.com/office/drawing/2014/main" xmlns="" id="{13F6B152-A369-489B-835D-0FF03C2A2125}"/>
-              </a:ext>
-            </a:extLst>
-          </p:cNvPr>
-          <p:cNvCxnSpPr/>
-          <p:nvPr/>
-        </p:nvCxnSpPr>
-        <p:spPr>
-          <a:xfrm flipH="1">
-            <a:off x="2229909" y="4151842"/>
-            <a:ext cx="567267" cy="374650"/>
-          </a:xfrm>
-          <a:prstGeom prst="straightConnector1">
-            <a:avLst/>
-          </a:prstGeom>
-          <a:ln>
-            <a:tailEnd type="triangle"/>
-          </a:ln>
-        </p:spPr>
-        <p:style>
-          <a:lnRef idx="1">
-            <a:schemeClr val="accent1"/>
-          </a:lnRef>
-          <a:fillRef idx="0">
-            <a:schemeClr val="accent1"/>
-          </a:fillRef>
-          <a:effectRef idx="0">
-            <a:schemeClr val="accent1"/>
-          </a:effectRef>
-          <a:fontRef idx="minor">
-            <a:schemeClr val="tx1"/>
-          </a:fontRef>
-        </p:style>
-      </p:cxnSp>
-      <p:sp>
-        <p:nvSpPr>
-          <p:cNvPr id="23" name="ZoneTexte 22">
-            <a:extLst>
-              <a:ext uri="{FF2B5EF4-FFF2-40B4-BE49-F238E27FC236}">
-                <a16:creationId xmlns:a16="http://schemas.microsoft.com/office/drawing/2014/main" xmlns="" id="{1C5B1F46-6A4B-4CFD-B46C-2A85E3592699}"/>
-              </a:ext>
-            </a:extLst>
-          </p:cNvPr>
-          <p:cNvSpPr txBox="1"/>
-          <p:nvPr/>
-        </p:nvSpPr>
-        <p:spPr>
-          <a:xfrm>
-            <a:off x="1363350" y="4576233"/>
-            <a:ext cx="1547284" cy="369332"/>
-          </a:xfrm>
-          <a:prstGeom prst="rect">
-            <a:avLst/>
-          </a:prstGeom>
-          <a:noFill/>
-        </p:spPr>
-        <p:txBody>
-          <a:bodyPr rot="0" spcFirstLastPara="0" vertOverflow="overflow" horzOverflow="overflow" vert="horz" wrap="square" lIns="91440" tIns="45720" rIns="91440" bIns="45720" numCol="1" spcCol="0" rtlCol="0" fromWordArt="0" anchor="t" anchorCtr="0" forceAA="0" compatLnSpc="1">
-            <a:prstTxWarp prst="textNoShape">
-              <a:avLst/>
-            </a:prstTxWarp>
-            <a:spAutoFit/>
-          </a:bodyPr>
-          <a:lstStyle/>
-          <a:p>
-            <a:r>
-              <a:rPr lang="fr-FR" dirty="0" err="1"/>
-              <a:t>GameService</a:t>
-            </a:r>
-          </a:p>
-        </p:txBody>
-      </p:sp>
-      <p:sp>
-        <p:nvSpPr>
-          <p:cNvPr id="25" name="ZoneTexte 24">
-            <a:extLst>
-              <a:ext uri="{FF2B5EF4-FFF2-40B4-BE49-F238E27FC236}">
-                <a16:creationId xmlns:a16="http://schemas.microsoft.com/office/drawing/2014/main" xmlns="" id="{2EA52589-ED59-40E4-BE3D-477B9CE0B034}"/>
-              </a:ext>
-            </a:extLst>
-          </p:cNvPr>
-          <p:cNvSpPr txBox="1"/>
-          <p:nvPr/>
-        </p:nvSpPr>
-        <p:spPr>
-          <a:xfrm>
-            <a:off x="5650442" y="4285192"/>
-            <a:ext cx="2743200" cy="369332"/>
-          </a:xfrm>
-          <a:prstGeom prst="rect">
-            <a:avLst/>
-          </a:prstGeom>
-          <a:noFill/>
-        </p:spPr>
-        <p:txBody>
-          <a:bodyPr rot="0" spcFirstLastPara="0" vertOverflow="overflow" horzOverflow="overflow" vert="horz" wrap="square" lIns="91440" tIns="45720" rIns="91440" bIns="45720" numCol="1" spcCol="0" rtlCol="0" fromWordArt="0" anchor="t" anchorCtr="0" forceAA="0" compatLnSpc="1">
-            <a:prstTxWarp prst="textNoShape">
-              <a:avLst/>
-            </a:prstTxWarp>
-            <a:spAutoFit/>
-          </a:bodyPr>
-          <a:lstStyle/>
-          <a:p>
-            <a:pPr algn="l"/>
-            <a:r>
-              <a:rPr lang="fr-FR" dirty="0"/>
-              <a:t>URL</a:t>
-            </a:r>
-          </a:p>
-        </p:txBody>
-      </p:sp>
-      <p:cxnSp>
-        <p:nvCxnSpPr>
-          <p:cNvPr id="27" name="Connecteur droit avec flèche 26">
-            <a:extLst>
-              <a:ext uri="{FF2B5EF4-FFF2-40B4-BE49-F238E27FC236}">
-                <a16:creationId xmlns:a16="http://schemas.microsoft.com/office/drawing/2014/main" xmlns="" id="{81BF1F82-CBC8-4B97-9288-83E808E7E6B4}"/>
-              </a:ext>
-            </a:extLst>
-          </p:cNvPr>
-          <p:cNvCxnSpPr/>
-          <p:nvPr/>
-        </p:nvCxnSpPr>
-        <p:spPr>
-          <a:xfrm flipH="1" flipV="1">
-            <a:off x="4542365" y="4044951"/>
-            <a:ext cx="1107017" cy="408515"/>
-          </a:xfrm>
-          <a:prstGeom prst="straightConnector1">
-            <a:avLst/>
-          </a:prstGeom>
-          <a:ln>
-            <a:tailEnd type="triangle"/>
-          </a:ln>
-        </p:spPr>
-        <p:style>
-          <a:lnRef idx="1">
-            <a:schemeClr val="accent1"/>
-          </a:lnRef>
-          <a:fillRef idx="0">
-            <a:schemeClr val="accent1"/>
-          </a:fillRef>
-          <a:effectRef idx="0">
-            <a:schemeClr val="accent1"/>
-          </a:effectRef>
-          <a:fontRef idx="minor">
-            <a:schemeClr val="tx1"/>
-          </a:fontRef>
-        </p:style>
-      </p:cxnSp>
-      <p:sp>
-        <p:nvSpPr>
-          <p:cNvPr id="28" name="ZoneTexte 27">
-            <a:extLst>
-              <a:ext uri="{FF2B5EF4-FFF2-40B4-BE49-F238E27FC236}">
-                <a16:creationId xmlns:a16="http://schemas.microsoft.com/office/drawing/2014/main" xmlns="" id="{C1F350B6-18CA-4137-8E05-C6AEDC38ED60}"/>
-              </a:ext>
-            </a:extLst>
-          </p:cNvPr>
-          <p:cNvSpPr txBox="1"/>
-          <p:nvPr/>
-        </p:nvSpPr>
-        <p:spPr>
-          <a:xfrm>
-            <a:off x="2586567" y="3666067"/>
-            <a:ext cx="2298700" cy="369332"/>
-          </a:xfrm>
-          <a:prstGeom prst="rect">
-            <a:avLst/>
-          </a:prstGeom>
-          <a:noFill/>
-        </p:spPr>
-        <p:txBody>
-          <a:bodyPr rot="0" spcFirstLastPara="0" vertOverflow="overflow" horzOverflow="overflow" vert="horz" wrap="square" lIns="91440" tIns="45720" rIns="91440" bIns="45720" numCol="1" spcCol="0" rtlCol="0" fromWordArt="0" anchor="t" anchorCtr="0" forceAA="0" compatLnSpc="1">
-            <a:prstTxWarp prst="textNoShape">
-              <a:avLst/>
-            </a:prstTxWarp>
-            <a:spAutoFit/>
-          </a:bodyPr>
-          <a:lstStyle/>
-          <a:p>
-            <a:pPr algn="l"/>
-            <a:r>
-              <a:rPr lang="fr-FR" dirty="0" err="1"/>
-              <a:t>GameListComponent</a:t>
-            </a:r>
-          </a:p>
-        </p:txBody>
-      </p:sp>
-      <p:sp>
-        <p:nvSpPr>
-          <p:cNvPr id="29" name="ZoneTexte 28">
-            <a:extLst>
-              <a:ext uri="{FF2B5EF4-FFF2-40B4-BE49-F238E27FC236}">
-                <a16:creationId xmlns:a16="http://schemas.microsoft.com/office/drawing/2014/main" xmlns="" id="{88A53BDC-1048-4301-996A-E81F721A2799}"/>
-              </a:ext>
-            </a:extLst>
-          </p:cNvPr>
-          <p:cNvSpPr txBox="1"/>
-          <p:nvPr/>
-        </p:nvSpPr>
-        <p:spPr>
-          <a:xfrm>
-            <a:off x="2475441" y="2337859"/>
-            <a:ext cx="2743200" cy="369332"/>
-          </a:xfrm>
-          <a:prstGeom prst="rect">
-            <a:avLst/>
-          </a:prstGeom>
-          <a:noFill/>
-        </p:spPr>
-        <p:txBody>
-          <a:bodyPr rot="0" spcFirstLastPara="0" vertOverflow="overflow" horzOverflow="overflow" vert="horz" wrap="square" lIns="91440" tIns="45720" rIns="91440" bIns="45720" numCol="1" spcCol="0" rtlCol="0" fromWordArt="0" anchor="t" anchorCtr="0" forceAA="0" compatLnSpc="1">
-            <a:prstTxWarp prst="textNoShape">
-              <a:avLst/>
-            </a:prstTxWarp>
-            <a:spAutoFit/>
-          </a:bodyPr>
-          <a:lstStyle/>
-          <a:p>
-            <a:pPr algn="l"/>
-            <a:r>
-              <a:rPr lang="fr-FR" dirty="0" err="1"/>
-              <a:t>GameItemComponent</a:t>
-            </a:r>
-          </a:p>
-        </p:txBody>
-      </p:sp>
-      <p:cxnSp>
-        <p:nvCxnSpPr>
-          <p:cNvPr id="30" name="Connecteur droit avec flèche 29">
-            <a:extLst>
-              <a:ext uri="{FF2B5EF4-FFF2-40B4-BE49-F238E27FC236}">
-                <a16:creationId xmlns:a16="http://schemas.microsoft.com/office/drawing/2014/main" xmlns="" id="{7E6D82CF-F970-4C6D-9DE1-A4EDB6E6BAE2}"/>
-              </a:ext>
-            </a:extLst>
-          </p:cNvPr>
-          <p:cNvCxnSpPr/>
-          <p:nvPr/>
-        </p:nvCxnSpPr>
-        <p:spPr>
-          <a:xfrm>
-            <a:off x="3395133" y="3321051"/>
-            <a:ext cx="4234" cy="289983"/>
-          </a:xfrm>
-          <a:prstGeom prst="straightConnector1">
-            <a:avLst/>
-          </a:prstGeom>
-          <a:ln>
-            <a:headEnd type="triangle"/>
-            <a:tailEnd type="triangle"/>
-          </a:ln>
-        </p:spPr>
-        <p:style>
-          <a:lnRef idx="1">
-            <a:schemeClr val="accent1"/>
-          </a:lnRef>
-          <a:fillRef idx="0">
-            <a:schemeClr val="accent1"/>
-          </a:fillRef>
-          <a:effectRef idx="0">
-            <a:schemeClr val="accent1"/>
-          </a:effectRef>
-          <a:fontRef idx="minor">
-            <a:schemeClr val="tx1"/>
-          </a:fontRef>
-        </p:style>
-      </p:cxnSp>
-      <p:cxnSp>
-        <p:nvCxnSpPr>
-          <p:cNvPr id="33" name="Connecteur droit avec flèche 32">
-            <a:extLst>
-              <a:ext uri="{FF2B5EF4-FFF2-40B4-BE49-F238E27FC236}">
-                <a16:creationId xmlns:a16="http://schemas.microsoft.com/office/drawing/2014/main" xmlns="" id="{C0043402-66EB-4E4A-9F23-B294C0B5CC6B}"/>
-              </a:ext>
-            </a:extLst>
-          </p:cNvPr>
-          <p:cNvCxnSpPr/>
-          <p:nvPr/>
-        </p:nvCxnSpPr>
-        <p:spPr>
-          <a:xfrm flipH="1">
-            <a:off x="3446992" y="2754842"/>
-            <a:ext cx="59267" cy="215900"/>
-          </a:xfrm>
-          <a:prstGeom prst="straightConnector1">
-            <a:avLst/>
-          </a:prstGeom>
-          <a:ln>
-            <a:headEnd type="triangle"/>
-            <a:tailEnd type="triangle"/>
-          </a:ln>
-        </p:spPr>
-        <p:style>
-          <a:lnRef idx="1">
-            <a:schemeClr val="accent1"/>
-          </a:lnRef>
-          <a:fillRef idx="0">
-            <a:schemeClr val="accent1"/>
-          </a:fillRef>
-          <a:effectRef idx="0">
-            <a:schemeClr val="accent1"/>
-          </a:effectRef>
-          <a:fontRef idx="minor">
-            <a:schemeClr val="tx1"/>
-          </a:fontRef>
-        </p:style>
-      </p:cxnSp>
-    </p:spTree>
-    <p:extLst>
-      <p:ext uri="{BB962C8B-B14F-4D97-AF65-F5344CB8AC3E}">
-        <p14:creationId xmlns:p14="http://schemas.microsoft.com/office/powerpoint/2010/main" val="903918130"/>
-      </p:ext>
-    </p:extLst>
-  </p:cSld>
-  <p:clrMapOvr>
-    <a:masterClrMapping/>
-  </p:clrMapOvr>
-  <p:timing>
-    <p:tnLst>
-      <p:par>
-        <p:cTn id="1" dur="indefinite" restart="never" nodeType="tmRoot"/>
-      </p:par>
-    </p:tnLst>
-  </p:timing>
-</p:sld>
-</file>
-
-<file path=ppt/slides/slide11.xml><?xml version="1.0" encoding="utf-8"?>
-<p:sld xmlns:a="http://schemas.openxmlformats.org/drawingml/2006/main" xmlns:r="http://schemas.openxmlformats.org/officeDocument/2006/relationships" xmlns:p="http://schemas.openxmlformats.org/presentationml/2006/main">
-  <p:cSld>
-    <p:spTree>
-      <p:nvGrpSpPr>
-        <p:cNvPr id="1" name=""/>
-        <p:cNvGrpSpPr/>
-        <p:nvPr/>
-      </p:nvGrpSpPr>
-      <p:grpSpPr>
-        <a:xfrm>
-          <a:off x="0" y="0"/>
-          <a:ext cx="0" cy="0"/>
-          <a:chOff x="0" y="0"/>
-          <a:chExt cx="0" cy="0"/>
-        </a:xfrm>
-      </p:grpSpPr>
-      <p:sp>
-        <p:nvSpPr>
-          <p:cNvPr id="2" name="Titre 1">
-            <a:extLst>
-              <a:ext uri="{FF2B5EF4-FFF2-40B4-BE49-F238E27FC236}">
-                <a16:creationId xmlns:a16="http://schemas.microsoft.com/office/drawing/2014/main" xmlns="" id="{ECC9877D-010A-4AE8-A590-5DB6D61E307D}"/>
-              </a:ext>
-            </a:extLst>
-          </p:cNvPr>
-          <p:cNvSpPr>
-            <a:spLocks noGrp="1"/>
-          </p:cNvSpPr>
-          <p:nvPr>
-            <p:ph type="title"/>
-          </p:nvPr>
-        </p:nvSpPr>
-        <p:spPr/>
-        <p:txBody>
-          <a:bodyPr/>
-          <a:lstStyle/>
-          <a:p>
-            <a:r>
-              <a:rPr lang="fr-FR" dirty="0"/>
-              <a:t>Implémentation des fonctionnalités</a:t>
-            </a:r>
-          </a:p>
-        </p:txBody>
-      </p:sp>
-      <p:sp>
-        <p:nvSpPr>
-          <p:cNvPr id="5" name="ZoneTexte 4">
-            <a:extLst>
-              <a:ext uri="{FF2B5EF4-FFF2-40B4-BE49-F238E27FC236}">
-                <a16:creationId xmlns:a16="http://schemas.microsoft.com/office/drawing/2014/main" xmlns="" id="{2D737C13-863C-4CEF-B304-BA892E0A1FF9}"/>
+                <a16:creationId xmlns="" xmlns:a16="http://schemas.microsoft.com/office/drawing/2014/main" id="{2D737C13-863C-4CEF-B304-BA892E0A1FF9}"/>
               </a:ext>
             </a:extLst>
           </p:cNvPr>
@@ -14073,7 +13476,7 @@
             <p:cNvPr id="34" name="ZoneTexte 33">
               <a:extLst>
                 <a:ext uri="{FF2B5EF4-FFF2-40B4-BE49-F238E27FC236}">
-                  <a16:creationId xmlns:a16="http://schemas.microsoft.com/office/drawing/2014/main" xmlns="" id="{6829C4DF-8079-454C-A81C-182BB22E8F2A}"/>
+                  <a16:creationId xmlns="" xmlns:a16="http://schemas.microsoft.com/office/drawing/2014/main" id="{6829C4DF-8079-454C-A81C-182BB22E8F2A}"/>
                 </a:ext>
               </a:extLst>
             </p:cNvPr>
@@ -14189,7 +13592,7 @@
             <p:cNvPr id="37" name="ZoneTexte 36">
               <a:extLst>
                 <a:ext uri="{FF2B5EF4-FFF2-40B4-BE49-F238E27FC236}">
-                  <a16:creationId xmlns:a16="http://schemas.microsoft.com/office/drawing/2014/main" xmlns="" id="{6829C4DF-8079-454C-A81C-182BB22E8F2A}"/>
+                  <a16:creationId xmlns="" xmlns:a16="http://schemas.microsoft.com/office/drawing/2014/main" id="{6829C4DF-8079-454C-A81C-182BB22E8F2A}"/>
                 </a:ext>
               </a:extLst>
             </p:cNvPr>
@@ -14529,7 +13932,7 @@
             <p:cNvPr id="45" name="ZoneTexte 44">
               <a:extLst>
                 <a:ext uri="{FF2B5EF4-FFF2-40B4-BE49-F238E27FC236}">
-                  <a16:creationId xmlns:a16="http://schemas.microsoft.com/office/drawing/2014/main" xmlns="" id="{6829C4DF-8079-454C-A81C-182BB22E8F2A}"/>
+                  <a16:creationId xmlns="" xmlns:a16="http://schemas.microsoft.com/office/drawing/2014/main" id="{6829C4DF-8079-454C-A81C-182BB22E8F2A}"/>
                 </a:ext>
               </a:extLst>
             </p:cNvPr>
@@ -14645,7 +14048,7 @@
             <p:cNvPr id="48" name="ZoneTexte 47">
               <a:extLst>
                 <a:ext uri="{FF2B5EF4-FFF2-40B4-BE49-F238E27FC236}">
-                  <a16:creationId xmlns:a16="http://schemas.microsoft.com/office/drawing/2014/main" xmlns="" id="{6829C4DF-8079-454C-A81C-182BB22E8F2A}"/>
+                  <a16:creationId xmlns="" xmlns:a16="http://schemas.microsoft.com/office/drawing/2014/main" id="{6829C4DF-8079-454C-A81C-182BB22E8F2A}"/>
                 </a:ext>
               </a:extLst>
             </p:cNvPr>
@@ -14866,7 +14269,7 @@
             <p:cNvPr id="58" name="ZoneTexte 57">
               <a:extLst>
                 <a:ext uri="{FF2B5EF4-FFF2-40B4-BE49-F238E27FC236}">
-                  <a16:creationId xmlns:a16="http://schemas.microsoft.com/office/drawing/2014/main" xmlns="" id="{6829C4DF-8079-454C-A81C-182BB22E8F2A}"/>
+                  <a16:creationId xmlns="" xmlns:a16="http://schemas.microsoft.com/office/drawing/2014/main" id="{6829C4DF-8079-454C-A81C-182BB22E8F2A}"/>
                 </a:ext>
               </a:extLst>
             </p:cNvPr>
@@ -14984,8 +14387,8 @@
   <p:clrMapOvr>
     <a:masterClrMapping/>
   </p:clrMapOvr>
-  <mc:AlternateContent xmlns:mc="http://schemas.openxmlformats.org/markup-compatibility/2006">
-    <mc:Choice xmlns:p14="http://schemas.microsoft.com/office/powerpoint/2010/main" Requires="p14">
+  <mc:AlternateContent xmlns:mc="http://schemas.openxmlformats.org/markup-compatibility/2006" xmlns:p14="http://schemas.microsoft.com/office/powerpoint/2010/main">
+    <mc:Choice Requires="p14">
       <p:timing>
         <p:tnLst>
           <p:par>
@@ -16854,7 +16257,7 @@
         </p:bldLst>
       </p:timing>
     </mc:Choice>
-    <mc:Fallback>
+    <mc:Fallback xmlns="">
       <p:timing>
         <p:tnLst>
           <p:par>
@@ -18727,7 +18130,7 @@
 </p:sld>
 </file>
 
-<file path=ppt/slides/slide12.xml><?xml version="1.0" encoding="utf-8"?>
+<file path=ppt/slides/slide11.xml><?xml version="1.0" encoding="utf-8"?>
 <p:sld xmlns:a="http://schemas.openxmlformats.org/drawingml/2006/main" xmlns:r="http://schemas.openxmlformats.org/officeDocument/2006/relationships" xmlns:p="http://schemas.openxmlformats.org/presentationml/2006/main">
   <p:cSld>
     <p:spTree>
@@ -18826,7 +18229,7 @@
           <p:cNvPr id="5" name="Image 5">
             <a:extLst>
               <a:ext uri="{FF2B5EF4-FFF2-40B4-BE49-F238E27FC236}">
-                <a16:creationId xmlns:a16="http://schemas.microsoft.com/office/drawing/2014/main" xmlns="" id="{F9CD578C-6564-4AFC-AE85-B9BFAF316CF0}"/>
+                <a16:creationId xmlns="" xmlns:a16="http://schemas.microsoft.com/office/drawing/2014/main" id="{F9CD578C-6564-4AFC-AE85-B9BFAF316CF0}"/>
               </a:ext>
             </a:extLst>
           </p:cNvPr>
@@ -18856,7 +18259,7 @@
           <p:cNvPr id="6" name="Image 6" descr="Une image contenant table&#10;&#10;Description générée automatiquement">
             <a:extLst>
               <a:ext uri="{FF2B5EF4-FFF2-40B4-BE49-F238E27FC236}">
-                <a16:creationId xmlns:a16="http://schemas.microsoft.com/office/drawing/2014/main" xmlns="" id="{851106C3-25F5-4E1F-832A-2E11F2940423}"/>
+                <a16:creationId xmlns="" xmlns:a16="http://schemas.microsoft.com/office/drawing/2014/main" id="{851106C3-25F5-4E1F-832A-2E11F2940423}"/>
               </a:ext>
             </a:extLst>
           </p:cNvPr>
@@ -19111,7 +18514,7 @@
 </p:sld>
 </file>
 
-<file path=ppt/slides/slide13.xml><?xml version="1.0" encoding="utf-8"?>
+<file path=ppt/slides/slide12.xml><?xml version="1.0" encoding="utf-8"?>
 <p:sld xmlns:a="http://schemas.openxmlformats.org/drawingml/2006/main" xmlns:r="http://schemas.openxmlformats.org/officeDocument/2006/relationships" xmlns:p="http://schemas.openxmlformats.org/presentationml/2006/main">
   <p:cSld>
     <p:spTree>
@@ -19133,7 +18536,7 @@
           <p:cNvPr id="2" name="Titre 1">
             <a:extLst>
               <a:ext uri="{FF2B5EF4-FFF2-40B4-BE49-F238E27FC236}">
-                <a16:creationId xmlns:a16="http://schemas.microsoft.com/office/drawing/2014/main" xmlns="" id="{ECC9877D-010A-4AE8-A590-5DB6D61E307D}"/>
+                <a16:creationId xmlns="" xmlns:a16="http://schemas.microsoft.com/office/drawing/2014/main" id="{ECC9877D-010A-4AE8-A590-5DB6D61E307D}"/>
               </a:ext>
             </a:extLst>
           </p:cNvPr>
@@ -19161,7 +18564,7 @@
           <p:cNvPr id="5" name="ZoneTexte 4">
             <a:extLst>
               <a:ext uri="{FF2B5EF4-FFF2-40B4-BE49-F238E27FC236}">
-                <a16:creationId xmlns:a16="http://schemas.microsoft.com/office/drawing/2014/main" xmlns="" id="{2D737C13-863C-4CEF-B304-BA892E0A1FF9}"/>
+                <a16:creationId xmlns="" xmlns:a16="http://schemas.microsoft.com/office/drawing/2014/main" id="{2D737C13-863C-4CEF-B304-BA892E0A1FF9}"/>
               </a:ext>
             </a:extLst>
           </p:cNvPr>
@@ -19199,7 +18602,7 @@
           <p:cNvPr id="7" name="Espace réservé du contenu 6">
             <a:extLst>
               <a:ext uri="{FF2B5EF4-FFF2-40B4-BE49-F238E27FC236}">
-                <a16:creationId xmlns:a16="http://schemas.microsoft.com/office/drawing/2014/main" xmlns="" id="{2E6CDD98-5412-467C-8FF4-3F16D35BD6F8}"/>
+                <a16:creationId xmlns="" xmlns:a16="http://schemas.microsoft.com/office/drawing/2014/main" id="{2E6CDD98-5412-467C-8FF4-3F16D35BD6F8}"/>
               </a:ext>
             </a:extLst>
           </p:cNvPr>
@@ -19273,7 +18676,7 @@
 </p:sld>
 </file>
 
-<file path=ppt/slides/slide14.xml><?xml version="1.0" encoding="utf-8"?>
+<file path=ppt/slides/slide13.xml><?xml version="1.0" encoding="utf-8"?>
 <p:sld xmlns:a="http://schemas.openxmlformats.org/drawingml/2006/main" xmlns:r="http://schemas.openxmlformats.org/officeDocument/2006/relationships" xmlns:p="http://schemas.openxmlformats.org/presentationml/2006/main">
   <p:cSld>
     <p:spTree>
@@ -19295,7 +18698,7 @@
           <p:cNvPr id="2" name="Titre 1">
             <a:extLst>
               <a:ext uri="{FF2B5EF4-FFF2-40B4-BE49-F238E27FC236}">
-                <a16:creationId xmlns:a16="http://schemas.microsoft.com/office/drawing/2014/main" xmlns="" id="{ECC9877D-010A-4AE8-A590-5DB6D61E307D}"/>
+                <a16:creationId xmlns="" xmlns:a16="http://schemas.microsoft.com/office/drawing/2014/main" id="{ECC9877D-010A-4AE8-A590-5DB6D61E307D}"/>
               </a:ext>
             </a:extLst>
           </p:cNvPr>
@@ -19323,7 +18726,7 @@
           <p:cNvPr id="5" name="ZoneTexte 4">
             <a:extLst>
               <a:ext uri="{FF2B5EF4-FFF2-40B4-BE49-F238E27FC236}">
-                <a16:creationId xmlns:a16="http://schemas.microsoft.com/office/drawing/2014/main" xmlns="" id="{2D737C13-863C-4CEF-B304-BA892E0A1FF9}"/>
+                <a16:creationId xmlns="" xmlns:a16="http://schemas.microsoft.com/office/drawing/2014/main" id="{2D737C13-863C-4CEF-B304-BA892E0A1FF9}"/>
               </a:ext>
             </a:extLst>
           </p:cNvPr>
@@ -19361,7 +18764,7 @@
           <p:cNvPr id="8" name="ZoneTexte 7">
             <a:extLst>
               <a:ext uri="{FF2B5EF4-FFF2-40B4-BE49-F238E27FC236}">
-                <a16:creationId xmlns:a16="http://schemas.microsoft.com/office/drawing/2014/main" xmlns="" id="{74F5E034-586F-4296-97C2-B3E427E0B120}"/>
+                <a16:creationId xmlns="" xmlns:a16="http://schemas.microsoft.com/office/drawing/2014/main" id="{74F5E034-586F-4296-97C2-B3E427E0B120}"/>
               </a:ext>
             </a:extLst>
           </p:cNvPr>
@@ -19400,7 +18803,15 @@
             </a:r>
             <a:r>
               <a:rPr lang="fr-FR" sz="2200" dirty="0"/>
-              <a:t>de passe crypter en </a:t>
+              <a:t>de passe </a:t>
+            </a:r>
+            <a:r>
+              <a:rPr lang="fr-FR" sz="2200" dirty="0" smtClean="0"/>
+              <a:t>crypté </a:t>
+            </a:r>
+            <a:r>
+              <a:rPr lang="fr-FR" sz="2200" dirty="0"/>
+              <a:t>en </a:t>
             </a:r>
             <a:r>
               <a:rPr lang="fr-FR" sz="2200" dirty="0" smtClean="0"/>
@@ -19503,7 +18914,7 @@
 </p:sld>
 </file>
 
-<file path=ppt/slides/slide15.xml><?xml version="1.0" encoding="utf-8"?>
+<file path=ppt/slides/slide14.xml><?xml version="1.0" encoding="utf-8"?>
 <p:sld xmlns:a="http://schemas.openxmlformats.org/drawingml/2006/main" xmlns:r="http://schemas.openxmlformats.org/officeDocument/2006/relationships" xmlns:p="http://schemas.openxmlformats.org/presentationml/2006/main">
   <p:cSld>
     <p:spTree>
@@ -19525,7 +18936,7 @@
           <p:cNvPr id="2" name="Titre 1">
             <a:extLst>
               <a:ext uri="{FF2B5EF4-FFF2-40B4-BE49-F238E27FC236}">
-                <a16:creationId xmlns:a16="http://schemas.microsoft.com/office/drawing/2014/main" xmlns="" id="{ECC9877D-010A-4AE8-A590-5DB6D61E307D}"/>
+                <a16:creationId xmlns="" xmlns:a16="http://schemas.microsoft.com/office/drawing/2014/main" id="{ECC9877D-010A-4AE8-A590-5DB6D61E307D}"/>
               </a:ext>
             </a:extLst>
           </p:cNvPr>
@@ -19553,7 +18964,7 @@
           <p:cNvPr id="5" name="ZoneTexte 4">
             <a:extLst>
               <a:ext uri="{FF2B5EF4-FFF2-40B4-BE49-F238E27FC236}">
-                <a16:creationId xmlns:a16="http://schemas.microsoft.com/office/drawing/2014/main" xmlns="" id="{2D737C13-863C-4CEF-B304-BA892E0A1FF9}"/>
+                <a16:creationId xmlns="" xmlns:a16="http://schemas.microsoft.com/office/drawing/2014/main" id="{2D737C13-863C-4CEF-B304-BA892E0A1FF9}"/>
               </a:ext>
             </a:extLst>
           </p:cNvPr>
@@ -19591,7 +19002,7 @@
           <p:cNvPr id="7" name="Espace réservé du contenu 6">
             <a:extLst>
               <a:ext uri="{FF2B5EF4-FFF2-40B4-BE49-F238E27FC236}">
-                <a16:creationId xmlns:a16="http://schemas.microsoft.com/office/drawing/2014/main" xmlns="" id="{58EA637C-6E2E-4F63-B291-CFD95C82625D}"/>
+                <a16:creationId xmlns="" xmlns:a16="http://schemas.microsoft.com/office/drawing/2014/main" id="{58EA637C-6E2E-4F63-B291-CFD95C82625D}"/>
               </a:ext>
             </a:extLst>
           </p:cNvPr>
@@ -19602,7 +19013,12 @@
             <p:ph idx="1"/>
           </p:nvPr>
         </p:nvSpPr>
-        <p:spPr/>
+        <p:spPr>
+          <a:xfrm>
+            <a:off x="1719481" y="2690921"/>
+            <a:ext cx="9905999" cy="3541714"/>
+          </a:xfrm>
+        </p:spPr>
         <p:txBody>
           <a:bodyPr vert="horz" lIns="91440" tIns="45720" rIns="91440" bIns="45720" rtlCol="0" anchor="t">
             <a:normAutofit/>
@@ -19648,7 +19064,7 @@
 </p:sld>
 </file>
 
-<file path=ppt/slides/slide16.xml><?xml version="1.0" encoding="utf-8"?>
+<file path=ppt/slides/slide15.xml><?xml version="1.0" encoding="utf-8"?>
 <p:sld xmlns:a="http://schemas.openxmlformats.org/drawingml/2006/main" xmlns:r="http://schemas.openxmlformats.org/officeDocument/2006/relationships" xmlns:p="http://schemas.openxmlformats.org/presentationml/2006/main">
   <p:cSld>
     <p:spTree>
@@ -19670,7 +19086,7 @@
           <p:cNvPr id="2" name="Titre 1">
             <a:extLst>
               <a:ext uri="{FF2B5EF4-FFF2-40B4-BE49-F238E27FC236}">
-                <a16:creationId xmlns:a16="http://schemas.microsoft.com/office/drawing/2014/main" xmlns="" id="{ECC9877D-010A-4AE8-A590-5DB6D61E307D}"/>
+                <a16:creationId xmlns="" xmlns:a16="http://schemas.microsoft.com/office/drawing/2014/main" id="{ECC9877D-010A-4AE8-A590-5DB6D61E307D}"/>
               </a:ext>
             </a:extLst>
           </p:cNvPr>
@@ -19698,7 +19114,7 @@
           <p:cNvPr id="5" name="ZoneTexte 4">
             <a:extLst>
               <a:ext uri="{FF2B5EF4-FFF2-40B4-BE49-F238E27FC236}">
-                <a16:creationId xmlns:a16="http://schemas.microsoft.com/office/drawing/2014/main" xmlns="" id="{2D737C13-863C-4CEF-B304-BA892E0A1FF9}"/>
+                <a16:creationId xmlns="" xmlns:a16="http://schemas.microsoft.com/office/drawing/2014/main" id="{2D737C13-863C-4CEF-B304-BA892E0A1FF9}"/>
               </a:ext>
             </a:extLst>
           </p:cNvPr>
@@ -19736,7 +19152,7 @@
           <p:cNvPr id="8" name="Image 9" descr="Une image contenant texte&#10;&#10;Description générée automatiquement">
             <a:extLst>
               <a:ext uri="{FF2B5EF4-FFF2-40B4-BE49-F238E27FC236}">
-                <a16:creationId xmlns:a16="http://schemas.microsoft.com/office/drawing/2014/main" xmlns="" id="{D67119C1-A218-4FD7-B792-3C684E94A45B}"/>
+                <a16:creationId xmlns="" xmlns:a16="http://schemas.microsoft.com/office/drawing/2014/main" id="{D67119C1-A218-4FD7-B792-3C684E94A45B}"/>
               </a:ext>
             </a:extLst>
           </p:cNvPr>
@@ -19766,7 +19182,7 @@
           <p:cNvPr id="10" name="Image 10" descr="Une image contenant texte&#10;&#10;Description générée automatiquement">
             <a:extLst>
               <a:ext uri="{FF2B5EF4-FFF2-40B4-BE49-F238E27FC236}">
-                <a16:creationId xmlns:a16="http://schemas.microsoft.com/office/drawing/2014/main" xmlns="" id="{29AA93C3-37EE-4FF2-B05F-52B22060CF2A}"/>
+                <a16:creationId xmlns="" xmlns:a16="http://schemas.microsoft.com/office/drawing/2014/main" id="{29AA93C3-37EE-4FF2-B05F-52B22060CF2A}"/>
               </a:ext>
             </a:extLst>
           </p:cNvPr>
@@ -20097,7 +19513,7 @@
 </p:sld>
 </file>
 
-<file path=ppt/slides/slide17.xml><?xml version="1.0" encoding="utf-8"?>
+<file path=ppt/slides/slide16.xml><?xml version="1.0" encoding="utf-8"?>
 <p:sld xmlns:a="http://schemas.openxmlformats.org/drawingml/2006/main" xmlns:r="http://schemas.openxmlformats.org/officeDocument/2006/relationships" xmlns:p="http://schemas.openxmlformats.org/presentationml/2006/main">
   <p:cSld>
     <p:spTree>
@@ -20119,7 +19535,7 @@
           <p:cNvPr id="2" name="Titre 1">
             <a:extLst>
               <a:ext uri="{FF2B5EF4-FFF2-40B4-BE49-F238E27FC236}">
-                <a16:creationId xmlns:a16="http://schemas.microsoft.com/office/drawing/2014/main" xmlns="" id="{95E10197-E3E0-4C75-9A67-16871CA8D165}"/>
+                <a16:creationId xmlns="" xmlns:a16="http://schemas.microsoft.com/office/drawing/2014/main" id="{95E10197-E3E0-4C75-9A67-16871CA8D165}"/>
               </a:ext>
             </a:extLst>
           </p:cNvPr>
@@ -20373,7 +19789,7 @@
 </p:sld>
 </file>
 
-<file path=ppt/slides/slide18.xml><?xml version="1.0" encoding="utf-8"?>
+<file path=ppt/slides/slide17.xml><?xml version="1.0" encoding="utf-8"?>
 <p:sld xmlns:a="http://schemas.openxmlformats.org/drawingml/2006/main" xmlns:r="http://schemas.openxmlformats.org/officeDocument/2006/relationships" xmlns:p="http://schemas.openxmlformats.org/presentationml/2006/main">
   <p:cSld>
     <p:spTree>
@@ -20395,7 +19811,7 @@
           <p:cNvPr id="2" name="Titre 1">
             <a:extLst>
               <a:ext uri="{FF2B5EF4-FFF2-40B4-BE49-F238E27FC236}">
-                <a16:creationId xmlns:a16="http://schemas.microsoft.com/office/drawing/2014/main" xmlns="" id="{2BA35FE3-B915-41D9-9296-082CA5AA9314}"/>
+                <a16:creationId xmlns="" xmlns:a16="http://schemas.microsoft.com/office/drawing/2014/main" id="{2BA35FE3-B915-41D9-9296-082CA5AA9314}"/>
               </a:ext>
             </a:extLst>
           </p:cNvPr>
@@ -20423,7 +19839,7 @@
           <p:cNvPr id="3" name="Espace réservé du contenu 2">
             <a:extLst>
               <a:ext uri="{FF2B5EF4-FFF2-40B4-BE49-F238E27FC236}">
-                <a16:creationId xmlns:a16="http://schemas.microsoft.com/office/drawing/2014/main" xmlns="" id="{FD29534A-AAED-4A2B-8840-788A4BB73889}"/>
+                <a16:creationId xmlns="" xmlns:a16="http://schemas.microsoft.com/office/drawing/2014/main" id="{FD29534A-AAED-4A2B-8840-788A4BB73889}"/>
               </a:ext>
             </a:extLst>
           </p:cNvPr>
@@ -20460,9 +19876,10 @@
               <a:t>Outils </a:t>
             </a:r>
             <a:r>
-              <a:rPr lang="fr-FR" sz="2200" dirty="0"/>
-              <a:t>performant</a:t>
+              <a:rPr lang="fr-FR" sz="2200" dirty="0" smtClean="0"/>
+              <a:t>performants</a:t>
             </a:r>
+            <a:endParaRPr lang="fr-FR" sz="2200" dirty="0"/>
           </a:p>
           <a:p>
             <a:r>
@@ -20491,7 +19908,7 @@
           <p:cNvPr id="5" name="Espace réservé du contenu 2">
             <a:extLst>
               <a:ext uri="{FF2B5EF4-FFF2-40B4-BE49-F238E27FC236}">
-                <a16:creationId xmlns:a16="http://schemas.microsoft.com/office/drawing/2014/main" xmlns="" id="{FD29534A-AAED-4A2B-8840-788A4BB73889}"/>
+                <a16:creationId xmlns="" xmlns:a16="http://schemas.microsoft.com/office/drawing/2014/main" id="{FD29534A-AAED-4A2B-8840-788A4BB73889}"/>
               </a:ext>
             </a:extLst>
           </p:cNvPr>
@@ -20511,7 +19928,7 @@
         </p:spPr>
         <p:txBody>
           <a:bodyPr vert="horz" lIns="91440" tIns="45720" rIns="91440" bIns="45720" rtlCol="0" anchor="t">
-            <a:normAutofit fontScale="92500"/>
+            <a:normAutofit fontScale="92500" lnSpcReduction="10000"/>
           </a:bodyPr>
           <a:lstStyle>
             <a:lvl1pPr marL="228600" indent="-228600" algn="l" defTabSz="914400" rtl="0" eaLnBrk="1" latinLnBrk="0" hangingPunct="1">
@@ -20697,23 +20114,12 @@
           </a:p>
           <a:p>
             <a:r>
-              <a:rPr lang="fr-FR" sz="2200" dirty="0" err="1"/>
-              <a:t>Angular</a:t>
+              <a:rPr lang="fr-FR" sz="2200" dirty="0" smtClean="0"/>
+              <a:t>Maitrise </a:t>
             </a:r>
             <a:r>
               <a:rPr lang="fr-FR" sz="2200" dirty="0"/>
-              <a:t> </a:t>
-            </a:r>
-            <a:r>
-              <a:rPr lang="fr-FR" sz="2200" dirty="0" err="1"/>
-              <a:t>material</a:t>
-            </a:r>
-            <a:endParaRPr lang="fr-FR" sz="2200" dirty="0"/>
-          </a:p>
-          <a:p>
-            <a:r>
-              <a:rPr lang="fr-FR" sz="2200" dirty="0"/>
-              <a:t>Maitrise d'</a:t>
+              <a:t>d'</a:t>
             </a:r>
             <a:r>
               <a:rPr lang="fr-FR" sz="2200" dirty="0" err="1"/>
@@ -20724,16 +20130,42 @@
               <a:t> par rapport à </a:t>
             </a:r>
             <a:r>
+              <a:rPr lang="fr-FR" sz="2200" dirty="0" err="1" smtClean="0"/>
+              <a:t>Spring</a:t>
+            </a:r>
+            <a:endParaRPr lang="fr-FR" sz="2200" dirty="0" smtClean="0"/>
+          </a:p>
+          <a:p>
+            <a:r>
               <a:rPr lang="fr-FR" sz="2200" dirty="0" err="1"/>
-              <a:t>Spring</a:t>
+              <a:t>Angular</a:t>
+            </a:r>
+            <a:r>
+              <a:rPr lang="fr-FR" sz="2200" dirty="0"/>
+              <a:t> </a:t>
+            </a:r>
+            <a:r>
+              <a:rPr lang="fr-FR" sz="2200" dirty="0" err="1" smtClean="0"/>
+              <a:t>material</a:t>
             </a:r>
             <a:endParaRPr lang="fr-FR" sz="2200" dirty="0"/>
           </a:p>
           <a:p>
             <a:r>
               <a:rPr lang="fr-FR" sz="2200" dirty="0"/>
-              <a:t>CORS et session</a:t>
+              <a:t>CORS et </a:t>
             </a:r>
+            <a:r>
+              <a:rPr lang="fr-FR" sz="2200" dirty="0" smtClean="0"/>
+              <a:t>session</a:t>
+            </a:r>
+          </a:p>
+          <a:p>
+            <a:r>
+              <a:rPr lang="fr-FR" sz="2200" dirty="0" smtClean="0"/>
+              <a:t>Validation customisée</a:t>
+            </a:r>
+            <a:endParaRPr lang="fr-FR" sz="2200" dirty="0"/>
           </a:p>
           <a:p>
             <a:r>
@@ -21066,7 +20498,7 @@
                                         <p:tgtEl>
                                           <p:spTgt spid="5">
                                             <p:txEl>
-                                              <p:charRg st="80" end="96"/>
+                                              <p:pRg st="3" end="3"/>
                                             </p:txEl>
                                           </p:spTgt>
                                         </p:tgtEl>
@@ -21097,7 +20529,7 @@
                                         <p:tgtEl>
                                           <p:spTgt spid="5">
                                             <p:txEl>
-                                              <p:charRg st="96" end="145"/>
+                                              <p:pRg st="4" end="4"/>
                                             </p:txEl>
                                           </p:spTgt>
                                         </p:tgtEl>
@@ -21128,7 +20560,38 @@
                                         <p:tgtEl>
                                           <p:spTgt spid="5">
                                             <p:txEl>
-                                              <p:charRg st="145" end="191"/>
+                                              <p:pRg st="5" end="5"/>
+                                            </p:txEl>
+                                          </p:spTgt>
+                                        </p:tgtEl>
+                                        <p:attrNameLst>
+                                          <p:attrName>style.visibility</p:attrName>
+                                        </p:attrNameLst>
+                                      </p:cBhvr>
+                                      <p:to>
+                                        <p:strVal val="visible"/>
+                                      </p:to>
+                                    </p:set>
+                                  </p:childTnLst>
+                                </p:cTn>
+                              </p:par>
+                              <p:par>
+                                <p:cTn id="31" presetID="1" presetClass="entr" presetSubtype="0" fill="hold" nodeType="withEffect">
+                                  <p:stCondLst>
+                                    <p:cond delay="0"/>
+                                  </p:stCondLst>
+                                  <p:childTnLst>
+                                    <p:set>
+                                      <p:cBhvr>
+                                        <p:cTn id="32" dur="1" fill="hold">
+                                          <p:stCondLst>
+                                            <p:cond delay="0"/>
+                                          </p:stCondLst>
+                                        </p:cTn>
+                                        <p:tgtEl>
+                                          <p:spTgt spid="5">
+                                            <p:txEl>
+                                              <p:pRg st="6" end="6"/>
                                             </p:txEl>
                                           </p:spTgt>
                                         </p:tgtEl>
@@ -21174,7 +20637,7 @@
 </p:sld>
 </file>
 
-<file path=ppt/slides/slide19.xml><?xml version="1.0" encoding="utf-8"?>
+<file path=ppt/slides/slide18.xml><?xml version="1.0" encoding="utf-8"?>
 <p:sld xmlns:a="http://schemas.openxmlformats.org/drawingml/2006/main" xmlns:r="http://schemas.openxmlformats.org/officeDocument/2006/relationships" xmlns:p="http://schemas.openxmlformats.org/presentationml/2006/main">
   <p:cSld>
     <p:spTree>
@@ -21196,7 +20659,7 @@
           <p:cNvPr id="2" name="Titre 1">
             <a:extLst>
               <a:ext uri="{FF2B5EF4-FFF2-40B4-BE49-F238E27FC236}">
-                <a16:creationId xmlns:a16="http://schemas.microsoft.com/office/drawing/2014/main" xmlns="" id="{EF1820DE-59BE-44BF-BB88-C002074D1E26}"/>
+                <a16:creationId xmlns="" xmlns:a16="http://schemas.microsoft.com/office/drawing/2014/main" id="{EF1820DE-59BE-44BF-BB88-C002074D1E26}"/>
               </a:ext>
             </a:extLst>
           </p:cNvPr>
@@ -21225,7 +20688,7 @@
           <p:cNvPr id="3" name="Espace réservé du contenu 2">
             <a:extLst>
               <a:ext uri="{FF2B5EF4-FFF2-40B4-BE49-F238E27FC236}">
-                <a16:creationId xmlns:a16="http://schemas.microsoft.com/office/drawing/2014/main" xmlns="" id="{7D2EBCD5-4395-489D-A7B6-16728201EADA}"/>
+                <a16:creationId xmlns="" xmlns:a16="http://schemas.microsoft.com/office/drawing/2014/main" id="{7D2EBCD5-4395-489D-A7B6-16728201EADA}"/>
               </a:ext>
             </a:extLst>
           </p:cNvPr>
@@ -21275,7 +20738,15 @@
             </a:pPr>
             <a:r>
               <a:rPr lang="fr-FR" dirty="0" smtClean="0"/>
-              <a:t>si vous avez des question !</a:t>
+              <a:t>si vous avez des </a:t>
+            </a:r>
+            <a:r>
+              <a:rPr lang="fr-FR" dirty="0" smtClean="0"/>
+              <a:t>questions </a:t>
+            </a:r>
+            <a:r>
+              <a:rPr lang="fr-FR" dirty="0" smtClean="0"/>
+              <a:t>!</a:t>
             </a:r>
             <a:endParaRPr lang="fr-FR" dirty="0"/>
           </a:p>
@@ -21364,7 +20835,7 @@
           <p:cNvPr id="2" name="Titre 1">
             <a:extLst>
               <a:ext uri="{FF2B5EF4-FFF2-40B4-BE49-F238E27FC236}">
-                <a16:creationId xmlns:a16="http://schemas.microsoft.com/office/drawing/2014/main" xmlns="" id="{1FCAAAEE-0187-4001-8595-197CF8E4D1BA}"/>
+                <a16:creationId xmlns="" xmlns:a16="http://schemas.microsoft.com/office/drawing/2014/main" id="{1FCAAAEE-0187-4001-8595-197CF8E4D1BA}"/>
               </a:ext>
             </a:extLst>
           </p:cNvPr>
@@ -21392,7 +20863,7 @@
           <p:cNvPr id="3" name="Espace réservé du contenu 2">
             <a:extLst>
               <a:ext uri="{FF2B5EF4-FFF2-40B4-BE49-F238E27FC236}">
-                <a16:creationId xmlns:a16="http://schemas.microsoft.com/office/drawing/2014/main" xmlns="" id="{6A6ED569-DF92-4C7F-93AF-0AC4228E0B74}"/>
+                <a16:creationId xmlns="" xmlns:a16="http://schemas.microsoft.com/office/drawing/2014/main" id="{6A6ED569-DF92-4C7F-93AF-0AC4228E0B74}"/>
               </a:ext>
             </a:extLst>
           </p:cNvPr>
@@ -21414,24 +20885,18 @@
               <a:buAutoNum type="arabicPeriod"/>
             </a:pPr>
             <a:r>
-              <a:rPr lang="fr-FR" dirty="0">
+              <a:rPr lang="fr-FR" dirty="0" smtClean="0">
                 <a:ea typeface="+mn-lt"/>
                 <a:cs typeface="+mn-lt"/>
               </a:rPr>
-              <a:t>Présentation générale</a:t>
+              <a:t>Organisation </a:t>
             </a:r>
-            <a:endParaRPr lang="fr-FR" dirty="0"/>
-          </a:p>
-          <a:p>
-            <a:pPr marL="457200" indent="-457200">
-              <a:buAutoNum type="arabicPeriod"/>
-            </a:pPr>
             <a:r>
               <a:rPr lang="fr-FR" dirty="0">
                 <a:ea typeface="+mn-lt"/>
                 <a:cs typeface="+mn-lt"/>
               </a:rPr>
-              <a:t>Organisation du projet</a:t>
+              <a:t>du projet</a:t>
             </a:r>
           </a:p>
           <a:p>
@@ -21527,7 +20992,7 @@
           <p:cNvPr id="2" name="Titre 1">
             <a:extLst>
               <a:ext uri="{FF2B5EF4-FFF2-40B4-BE49-F238E27FC236}">
-                <a16:creationId xmlns:a16="http://schemas.microsoft.com/office/drawing/2014/main" xmlns="" id="{ECC9877D-010A-4AE8-A590-5DB6D61E307D}"/>
+                <a16:creationId xmlns="" xmlns:a16="http://schemas.microsoft.com/office/drawing/2014/main" id="{ECC9877D-010A-4AE8-A590-5DB6D61E307D}"/>
               </a:ext>
             </a:extLst>
           </p:cNvPr>
@@ -21555,7 +21020,7 @@
           <p:cNvPr id="5" name="ZoneTexte 4">
             <a:extLst>
               <a:ext uri="{FF2B5EF4-FFF2-40B4-BE49-F238E27FC236}">
-                <a16:creationId xmlns:a16="http://schemas.microsoft.com/office/drawing/2014/main" xmlns="" id="{2D737C13-863C-4CEF-B304-BA892E0A1FF9}"/>
+                <a16:creationId xmlns="" xmlns:a16="http://schemas.microsoft.com/office/drawing/2014/main" id="{2D737C13-863C-4CEF-B304-BA892E0A1FF9}"/>
               </a:ext>
             </a:extLst>
           </p:cNvPr>
@@ -21595,7 +21060,7 @@
           <p:cNvPr id="7" name="ZoneTexte 6">
             <a:extLst>
               <a:ext uri="{FF2B5EF4-FFF2-40B4-BE49-F238E27FC236}">
-                <a16:creationId xmlns:a16="http://schemas.microsoft.com/office/drawing/2014/main" xmlns="" id="{A3B9637E-6102-4AB7-853D-23FC45C1AD32}"/>
+                <a16:creationId xmlns="" xmlns:a16="http://schemas.microsoft.com/office/drawing/2014/main" id="{A3B9637E-6102-4AB7-853D-23FC45C1AD32}"/>
               </a:ext>
             </a:extLst>
           </p:cNvPr>
@@ -21631,7 +21096,7 @@
           <p:cNvPr id="8" name="Image 8" descr="Une image contenant texte, capture d’écran, moniteur, écran&#10;&#10;Description générée automatiquement">
             <a:extLst>
               <a:ext uri="{FF2B5EF4-FFF2-40B4-BE49-F238E27FC236}">
-                <a16:creationId xmlns:a16="http://schemas.microsoft.com/office/drawing/2014/main" xmlns="" id="{FEB69434-B299-4500-95A2-980941A6583A}"/>
+                <a16:creationId xmlns="" xmlns:a16="http://schemas.microsoft.com/office/drawing/2014/main" id="{FEB69434-B299-4500-95A2-980941A6583A}"/>
               </a:ext>
             </a:extLst>
           </p:cNvPr>
@@ -21661,7 +21126,7 @@
           <p:cNvPr id="9" name="ZoneTexte 8">
             <a:extLst>
               <a:ext uri="{FF2B5EF4-FFF2-40B4-BE49-F238E27FC236}">
-                <a16:creationId xmlns:a16="http://schemas.microsoft.com/office/drawing/2014/main" xmlns="" id="{E2831C4D-6DBE-4E92-A520-129DFECE8FF8}"/>
+                <a16:creationId xmlns="" xmlns:a16="http://schemas.microsoft.com/office/drawing/2014/main" id="{E2831C4D-6DBE-4E92-A520-129DFECE8FF8}"/>
               </a:ext>
             </a:extLst>
           </p:cNvPr>
@@ -21699,7 +21164,7 @@
           <p:cNvPr id="11" name="Image 11" descr="Une image contenant texte, capture d’écran, moniteur&#10;&#10;Description générée automatiquement">
             <a:extLst>
               <a:ext uri="{FF2B5EF4-FFF2-40B4-BE49-F238E27FC236}">
-                <a16:creationId xmlns:a16="http://schemas.microsoft.com/office/drawing/2014/main" xmlns="" id="{1C7DA086-FCB0-4B05-B3CC-F61A2381D03B}"/>
+                <a16:creationId xmlns="" xmlns:a16="http://schemas.microsoft.com/office/drawing/2014/main" id="{1C7DA086-FCB0-4B05-B3CC-F61A2381D03B}"/>
               </a:ext>
             </a:extLst>
           </p:cNvPr>
@@ -21729,7 +21194,7 @@
           <p:cNvPr id="12" name="ZoneTexte 11">
             <a:extLst>
               <a:ext uri="{FF2B5EF4-FFF2-40B4-BE49-F238E27FC236}">
-                <a16:creationId xmlns:a16="http://schemas.microsoft.com/office/drawing/2014/main" xmlns="" id="{FA85EE86-D051-4D44-B2EA-3741CA855EF7}"/>
+                <a16:creationId xmlns="" xmlns:a16="http://schemas.microsoft.com/office/drawing/2014/main" id="{FA85EE86-D051-4D44-B2EA-3741CA855EF7}"/>
               </a:ext>
             </a:extLst>
           </p:cNvPr>
@@ -21767,7 +21232,7 @@
           <p:cNvPr id="13" name="ZoneTexte 12">
             <a:extLst>
               <a:ext uri="{FF2B5EF4-FFF2-40B4-BE49-F238E27FC236}">
-                <a16:creationId xmlns:a16="http://schemas.microsoft.com/office/drawing/2014/main" xmlns="" id="{F5027067-BAD9-412C-8D61-0F8E52864662}"/>
+                <a16:creationId xmlns="" xmlns:a16="http://schemas.microsoft.com/office/drawing/2014/main" id="{F5027067-BAD9-412C-8D61-0F8E52864662}"/>
               </a:ext>
             </a:extLst>
           </p:cNvPr>
@@ -22233,7 +21698,7 @@
           <p:cNvPr id="2" name="Titre 1">
             <a:extLst>
               <a:ext uri="{FF2B5EF4-FFF2-40B4-BE49-F238E27FC236}">
-                <a16:creationId xmlns:a16="http://schemas.microsoft.com/office/drawing/2014/main" xmlns="" id="{ECC9877D-010A-4AE8-A590-5DB6D61E307D}"/>
+                <a16:creationId xmlns="" xmlns:a16="http://schemas.microsoft.com/office/drawing/2014/main" id="{ECC9877D-010A-4AE8-A590-5DB6D61E307D}"/>
               </a:ext>
             </a:extLst>
           </p:cNvPr>
@@ -22261,7 +21726,7 @@
           <p:cNvPr id="4" name="Image 5">
             <a:extLst>
               <a:ext uri="{FF2B5EF4-FFF2-40B4-BE49-F238E27FC236}">
-                <a16:creationId xmlns:a16="http://schemas.microsoft.com/office/drawing/2014/main" xmlns="" id="{96A8F94A-E086-42C9-B963-FE52C9384158}"/>
+                <a16:creationId xmlns="" xmlns:a16="http://schemas.microsoft.com/office/drawing/2014/main" id="{96A8F94A-E086-42C9-B963-FE52C9384158}"/>
               </a:ext>
             </a:extLst>
           </p:cNvPr>
@@ -22290,7 +21755,7 @@
           <p:cNvPr id="5" name="ZoneTexte 4">
             <a:extLst>
               <a:ext uri="{FF2B5EF4-FFF2-40B4-BE49-F238E27FC236}">
-                <a16:creationId xmlns:a16="http://schemas.microsoft.com/office/drawing/2014/main" xmlns="" id="{2D737C13-863C-4CEF-B304-BA892E0A1FF9}"/>
+                <a16:creationId xmlns="" xmlns:a16="http://schemas.microsoft.com/office/drawing/2014/main" id="{2D737C13-863C-4CEF-B304-BA892E0A1FF9}"/>
               </a:ext>
             </a:extLst>
           </p:cNvPr>
@@ -22329,7 +21794,7 @@
           <p:cNvPr id="6" name="ZoneTexte 5">
             <a:extLst>
               <a:ext uri="{FF2B5EF4-FFF2-40B4-BE49-F238E27FC236}">
-                <a16:creationId xmlns:a16="http://schemas.microsoft.com/office/drawing/2014/main" xmlns="" id="{8615B7A2-EDFD-4631-9F6B-9A4A1E560B7E}"/>
+                <a16:creationId xmlns="" xmlns:a16="http://schemas.microsoft.com/office/drawing/2014/main" id="{8615B7A2-EDFD-4631-9F6B-9A4A1E560B7E}"/>
               </a:ext>
             </a:extLst>
           </p:cNvPr>
@@ -22367,7 +21832,7 @@
           <p:cNvPr id="7" name="Image 7">
             <a:extLst>
               <a:ext uri="{FF2B5EF4-FFF2-40B4-BE49-F238E27FC236}">
-                <a16:creationId xmlns:a16="http://schemas.microsoft.com/office/drawing/2014/main" xmlns="" id="{6A02A3D5-16A6-46ED-8DBC-4B52FC28EC47}"/>
+                <a16:creationId xmlns="" xmlns:a16="http://schemas.microsoft.com/office/drawing/2014/main" id="{6A02A3D5-16A6-46ED-8DBC-4B52FC28EC47}"/>
               </a:ext>
             </a:extLst>
           </p:cNvPr>
@@ -22397,7 +21862,7 @@
           <p:cNvPr id="8" name="ZoneTexte 7">
             <a:extLst>
               <a:ext uri="{FF2B5EF4-FFF2-40B4-BE49-F238E27FC236}">
-                <a16:creationId xmlns:a16="http://schemas.microsoft.com/office/drawing/2014/main" xmlns="" id="{F68B0CA0-348D-4AF3-B689-2EB3760B339A}"/>
+                <a16:creationId xmlns="" xmlns:a16="http://schemas.microsoft.com/office/drawing/2014/main" id="{F68B0CA0-348D-4AF3-B689-2EB3760B339A}"/>
               </a:ext>
             </a:extLst>
           </p:cNvPr>
@@ -22532,7 +21997,7 @@
                             </p:stCondLst>
                             <p:childTnLst>
                               <p:par>
-                                <p:cTn id="5" presetID="2" presetClass="entr" presetSubtype="4" fill="hold" nodeType="clickEffect">
+                                <p:cTn id="5" presetID="2" presetClass="entr" presetSubtype="1" fill="hold" grpId="0" nodeType="clickEffect">
                                   <p:stCondLst>
                                     <p:cond delay="0"/>
                                   </p:stCondLst>
@@ -22545,7 +22010,7 @@
                                           </p:stCondLst>
                                         </p:cTn>
                                         <p:tgtEl>
-                                          <p:spTgt spid="4"/>
+                                          <p:spTgt spid="3"/>
                                         </p:tgtEl>
                                         <p:attrNameLst>
                                           <p:attrName>style.visibility</p:attrName>
@@ -22559,7 +22024,7 @@
                                       <p:cBhvr additive="base">
                                         <p:cTn id="7" dur="500" fill="hold"/>
                                         <p:tgtEl>
-                                          <p:spTgt spid="4"/>
+                                          <p:spTgt spid="3"/>
                                         </p:tgtEl>
                                         <p:attrNameLst>
                                           <p:attrName>ppt_x</p:attrName>
@@ -22582,7 +22047,7 @@
                                       <p:cBhvr additive="base">
                                         <p:cTn id="8" dur="500" fill="hold"/>
                                         <p:tgtEl>
-                                          <p:spTgt spid="4"/>
+                                          <p:spTgt spid="3"/>
                                         </p:tgtEl>
                                         <p:attrNameLst>
                                           <p:attrName>ppt_y</p:attrName>
@@ -22591,7 +22056,7 @@
                                       <p:tavLst>
                                         <p:tav tm="0">
                                           <p:val>
-                                            <p:strVal val="1+#ppt_h/2"/>
+                                            <p:strVal val="0-#ppt_h/2"/>
                                           </p:val>
                                         </p:tav>
                                         <p:tav tm="100000">
@@ -22605,7 +22070,7 @@
                                 </p:cTn>
                               </p:par>
                               <p:par>
-                                <p:cTn id="9" presetID="2" presetClass="entr" presetSubtype="1" fill="hold" grpId="0" nodeType="withEffect">
+                                <p:cTn id="9" presetID="2" presetClass="entr" presetSubtype="4" fill="hold" nodeType="withEffect">
                                   <p:stCondLst>
                                     <p:cond delay="0"/>
                                   </p:stCondLst>
@@ -22618,7 +22083,7 @@
                                           </p:stCondLst>
                                         </p:cTn>
                                         <p:tgtEl>
-                                          <p:spTgt spid="6"/>
+                                          <p:spTgt spid="1026"/>
                                         </p:tgtEl>
                                         <p:attrNameLst>
                                           <p:attrName>style.visibility</p:attrName>
@@ -22632,7 +22097,7 @@
                                       <p:cBhvr additive="base">
                                         <p:cTn id="11" dur="500" fill="hold"/>
                                         <p:tgtEl>
-                                          <p:spTgt spid="6"/>
+                                          <p:spTgt spid="1026"/>
                                         </p:tgtEl>
                                         <p:attrNameLst>
                                           <p:attrName>ppt_x</p:attrName>
@@ -22655,7 +22120,7 @@
                                       <p:cBhvr additive="base">
                                         <p:cTn id="12" dur="500" fill="hold"/>
                                         <p:tgtEl>
-                                          <p:spTgt spid="6"/>
+                                          <p:spTgt spid="1026"/>
                                         </p:tgtEl>
                                         <p:attrNameLst>
                                           <p:attrName>ppt_y</p:attrName>
@@ -22664,7 +22129,7 @@
                                       <p:tavLst>
                                         <p:tav tm="0">
                                           <p:val>
-                                            <p:strVal val="0-#ppt_h/2"/>
+                                            <p:strVal val="1+#ppt_h/2"/>
                                           </p:val>
                                         </p:tav>
                                         <p:tav tm="100000">
@@ -22696,14 +22161,232 @@
                             </p:stCondLst>
                             <p:childTnLst>
                               <p:par>
-                                <p:cTn id="15" presetID="2" presetClass="exit" presetSubtype="1" fill="hold" nodeType="clickEffect">
+                                <p:cTn id="15" presetID="2" presetClass="entr" presetSubtype="4" fill="hold" nodeType="clickEffect">
+                                  <p:stCondLst>
+                                    <p:cond delay="0"/>
+                                  </p:stCondLst>
+                                  <p:childTnLst>
+                                    <p:set>
+                                      <p:cBhvr>
+                                        <p:cTn id="16" dur="1" fill="hold">
+                                          <p:stCondLst>
+                                            <p:cond delay="0"/>
+                                          </p:stCondLst>
+                                        </p:cTn>
+                                        <p:tgtEl>
+                                          <p:spTgt spid="4"/>
+                                        </p:tgtEl>
+                                        <p:attrNameLst>
+                                          <p:attrName>style.visibility</p:attrName>
+                                        </p:attrNameLst>
+                                      </p:cBhvr>
+                                      <p:to>
+                                        <p:strVal val="visible"/>
+                                      </p:to>
+                                    </p:set>
+                                    <p:anim calcmode="lin" valueType="num">
+                                      <p:cBhvr additive="base">
+                                        <p:cTn id="17" dur="500" fill="hold"/>
+                                        <p:tgtEl>
+                                          <p:spTgt spid="4"/>
+                                        </p:tgtEl>
+                                        <p:attrNameLst>
+                                          <p:attrName>ppt_x</p:attrName>
+                                        </p:attrNameLst>
+                                      </p:cBhvr>
+                                      <p:tavLst>
+                                        <p:tav tm="0">
+                                          <p:val>
+                                            <p:strVal val="#ppt_x"/>
+                                          </p:val>
+                                        </p:tav>
+                                        <p:tav tm="100000">
+                                          <p:val>
+                                            <p:strVal val="#ppt_x"/>
+                                          </p:val>
+                                        </p:tav>
+                                      </p:tavLst>
+                                    </p:anim>
+                                    <p:anim calcmode="lin" valueType="num">
+                                      <p:cBhvr additive="base">
+                                        <p:cTn id="18" dur="500" fill="hold"/>
+                                        <p:tgtEl>
+                                          <p:spTgt spid="4"/>
+                                        </p:tgtEl>
+                                        <p:attrNameLst>
+                                          <p:attrName>ppt_y</p:attrName>
+                                        </p:attrNameLst>
+                                      </p:cBhvr>
+                                      <p:tavLst>
+                                        <p:tav tm="0">
+                                          <p:val>
+                                            <p:strVal val="1+#ppt_h/2"/>
+                                          </p:val>
+                                        </p:tav>
+                                        <p:tav tm="100000">
+                                          <p:val>
+                                            <p:strVal val="#ppt_y"/>
+                                          </p:val>
+                                        </p:tav>
+                                      </p:tavLst>
+                                    </p:anim>
+                                  </p:childTnLst>
+                                </p:cTn>
+                              </p:par>
+                              <p:par>
+                                <p:cTn id="19" presetID="2" presetClass="entr" presetSubtype="1" fill="hold" grpId="0" nodeType="withEffect">
+                                  <p:stCondLst>
+                                    <p:cond delay="0"/>
+                                  </p:stCondLst>
+                                  <p:childTnLst>
+                                    <p:set>
+                                      <p:cBhvr>
+                                        <p:cTn id="20" dur="1" fill="hold">
+                                          <p:stCondLst>
+                                            <p:cond delay="0"/>
+                                          </p:stCondLst>
+                                        </p:cTn>
+                                        <p:tgtEl>
+                                          <p:spTgt spid="6"/>
+                                        </p:tgtEl>
+                                        <p:attrNameLst>
+                                          <p:attrName>style.visibility</p:attrName>
+                                        </p:attrNameLst>
+                                      </p:cBhvr>
+                                      <p:to>
+                                        <p:strVal val="visible"/>
+                                      </p:to>
+                                    </p:set>
+                                    <p:anim calcmode="lin" valueType="num">
+                                      <p:cBhvr additive="base">
+                                        <p:cTn id="21" dur="500" fill="hold"/>
+                                        <p:tgtEl>
+                                          <p:spTgt spid="6"/>
+                                        </p:tgtEl>
+                                        <p:attrNameLst>
+                                          <p:attrName>ppt_x</p:attrName>
+                                        </p:attrNameLst>
+                                      </p:cBhvr>
+                                      <p:tavLst>
+                                        <p:tav tm="0">
+                                          <p:val>
+                                            <p:strVal val="#ppt_x"/>
+                                          </p:val>
+                                        </p:tav>
+                                        <p:tav tm="100000">
+                                          <p:val>
+                                            <p:strVal val="#ppt_x"/>
+                                          </p:val>
+                                        </p:tav>
+                                      </p:tavLst>
+                                    </p:anim>
+                                    <p:anim calcmode="lin" valueType="num">
+                                      <p:cBhvr additive="base">
+                                        <p:cTn id="22" dur="500" fill="hold"/>
+                                        <p:tgtEl>
+                                          <p:spTgt spid="6"/>
+                                        </p:tgtEl>
+                                        <p:attrNameLst>
+                                          <p:attrName>ppt_y</p:attrName>
+                                        </p:attrNameLst>
+                                      </p:cBhvr>
+                                      <p:tavLst>
+                                        <p:tav tm="0">
+                                          <p:val>
+                                            <p:strVal val="0-#ppt_h/2"/>
+                                          </p:val>
+                                        </p:tav>
+                                        <p:tav tm="100000">
+                                          <p:val>
+                                            <p:strVal val="#ppt_y"/>
+                                          </p:val>
+                                        </p:tav>
+                                      </p:tavLst>
+                                    </p:anim>
+                                  </p:childTnLst>
+                                </p:cTn>
+                              </p:par>
+                              <p:par>
+                                <p:cTn id="23" presetID="1" presetClass="exit" presetSubtype="0" fill="hold" grpId="1" nodeType="withEffect">
+                                  <p:stCondLst>
+                                    <p:cond delay="0"/>
+                                  </p:stCondLst>
+                                  <p:childTnLst>
+                                    <p:set>
+                                      <p:cBhvr>
+                                        <p:cTn id="24" dur="1" fill="hold">
+                                          <p:stCondLst>
+                                            <p:cond delay="0"/>
+                                          </p:stCondLst>
+                                        </p:cTn>
+                                        <p:tgtEl>
+                                          <p:spTgt spid="3"/>
+                                        </p:tgtEl>
+                                        <p:attrNameLst>
+                                          <p:attrName>style.visibility</p:attrName>
+                                        </p:attrNameLst>
+                                      </p:cBhvr>
+                                      <p:to>
+                                        <p:strVal val="hidden"/>
+                                      </p:to>
+                                    </p:set>
+                                  </p:childTnLst>
+                                </p:cTn>
+                              </p:par>
+                              <p:par>
+                                <p:cTn id="25" presetID="1" presetClass="exit" presetSubtype="0" fill="hold" nodeType="withEffect">
+                                  <p:stCondLst>
+                                    <p:cond delay="0"/>
+                                  </p:stCondLst>
+                                  <p:childTnLst>
+                                    <p:set>
+                                      <p:cBhvr>
+                                        <p:cTn id="26" dur="1" fill="hold">
+                                          <p:stCondLst>
+                                            <p:cond delay="0"/>
+                                          </p:stCondLst>
+                                        </p:cTn>
+                                        <p:tgtEl>
+                                          <p:spTgt spid="1026"/>
+                                        </p:tgtEl>
+                                        <p:attrNameLst>
+                                          <p:attrName>style.visibility</p:attrName>
+                                        </p:attrNameLst>
+                                      </p:cBhvr>
+                                      <p:to>
+                                        <p:strVal val="hidden"/>
+                                      </p:to>
+                                    </p:set>
+                                  </p:childTnLst>
+                                </p:cTn>
+                              </p:par>
+                            </p:childTnLst>
+                          </p:cTn>
+                        </p:par>
+                      </p:childTnLst>
+                    </p:cTn>
+                  </p:par>
+                  <p:par>
+                    <p:cTn id="27" fill="hold">
+                      <p:stCondLst>
+                        <p:cond delay="indefinite"/>
+                      </p:stCondLst>
+                      <p:childTnLst>
+                        <p:par>
+                          <p:cTn id="28" fill="hold">
+                            <p:stCondLst>
+                              <p:cond delay="0"/>
+                            </p:stCondLst>
+                            <p:childTnLst>
+                              <p:par>
+                                <p:cTn id="29" presetID="2" presetClass="exit" presetSubtype="1" fill="hold" nodeType="clickEffect">
                                   <p:stCondLst>
                                     <p:cond delay="0"/>
                                   </p:stCondLst>
                                   <p:childTnLst>
                                     <p:anim calcmode="lin" valueType="num">
                                       <p:cBhvr additive="base">
-                                        <p:cTn id="16" dur="500"/>
+                                        <p:cTn id="30" dur="500"/>
                                         <p:tgtEl>
                                           <p:spTgt spid="4"/>
                                         </p:tgtEl>
@@ -22726,7 +22409,7 @@
                                     </p:anim>
                                     <p:anim calcmode="lin" valueType="num">
                                       <p:cBhvr additive="base">
-                                        <p:cTn id="17" dur="500"/>
+                                        <p:cTn id="31" dur="500"/>
                                         <p:tgtEl>
                                           <p:spTgt spid="4"/>
                                         </p:tgtEl>
@@ -22749,7 +22432,7 @@
                                     </p:anim>
                                     <p:set>
                                       <p:cBhvr>
-                                        <p:cTn id="18" dur="1" fill="hold">
+                                        <p:cTn id="32" dur="1" fill="hold">
                                           <p:stCondLst>
                                             <p:cond delay="499"/>
                                           </p:stCondLst>
@@ -22769,14 +22452,14 @@
                                 </p:cTn>
                               </p:par>
                               <p:par>
-                                <p:cTn id="19" presetID="2" presetClass="exit" presetSubtype="4" fill="hold" grpId="1" nodeType="withEffect">
+                                <p:cTn id="33" presetID="2" presetClass="exit" presetSubtype="4" fill="hold" grpId="1" nodeType="withEffect">
                                   <p:stCondLst>
                                     <p:cond delay="0"/>
                                   </p:stCondLst>
                                   <p:childTnLst>
                                     <p:anim calcmode="lin" valueType="num">
                                       <p:cBhvr additive="base">
-                                        <p:cTn id="20" dur="500"/>
+                                        <p:cTn id="34" dur="500"/>
                                         <p:tgtEl>
                                           <p:spTgt spid="6"/>
                                         </p:tgtEl>
@@ -22799,246 +22482,9 @@
                                     </p:anim>
                                     <p:anim calcmode="lin" valueType="num">
                                       <p:cBhvr additive="base">
-                                        <p:cTn id="21" dur="500"/>
+                                        <p:cTn id="35" dur="500"/>
                                         <p:tgtEl>
                                           <p:spTgt spid="6"/>
-                                        </p:tgtEl>
-                                        <p:attrNameLst>
-                                          <p:attrName>ppt_y</p:attrName>
-                                        </p:attrNameLst>
-                                      </p:cBhvr>
-                                      <p:tavLst>
-                                        <p:tav tm="0">
-                                          <p:val>
-                                            <p:strVal val="ppt_y"/>
-                                          </p:val>
-                                        </p:tav>
-                                        <p:tav tm="100000">
-                                          <p:val>
-                                            <p:strVal val="1+ppt_h/2"/>
-                                          </p:val>
-                                        </p:tav>
-                                      </p:tavLst>
-                                    </p:anim>
-                                    <p:set>
-                                      <p:cBhvr>
-                                        <p:cTn id="22" dur="1" fill="hold">
-                                          <p:stCondLst>
-                                            <p:cond delay="499"/>
-                                          </p:stCondLst>
-                                        </p:cTn>
-                                        <p:tgtEl>
-                                          <p:spTgt spid="6"/>
-                                        </p:tgtEl>
-                                        <p:attrNameLst>
-                                          <p:attrName>style.visibility</p:attrName>
-                                        </p:attrNameLst>
-                                      </p:cBhvr>
-                                      <p:to>
-                                        <p:strVal val="hidden"/>
-                                      </p:to>
-                                    </p:set>
-                                  </p:childTnLst>
-                                </p:cTn>
-                              </p:par>
-                              <p:par>
-                                <p:cTn id="23" presetID="2" presetClass="entr" presetSubtype="1" fill="hold" nodeType="withEffect">
-                                  <p:stCondLst>
-                                    <p:cond delay="0"/>
-                                  </p:stCondLst>
-                                  <p:childTnLst>
-                                    <p:set>
-                                      <p:cBhvr>
-                                        <p:cTn id="24" dur="1" fill="hold">
-                                          <p:stCondLst>
-                                            <p:cond delay="0"/>
-                                          </p:stCondLst>
-                                        </p:cTn>
-                                        <p:tgtEl>
-                                          <p:spTgt spid="7"/>
-                                        </p:tgtEl>
-                                        <p:attrNameLst>
-                                          <p:attrName>style.visibility</p:attrName>
-                                        </p:attrNameLst>
-                                      </p:cBhvr>
-                                      <p:to>
-                                        <p:strVal val="visible"/>
-                                      </p:to>
-                                    </p:set>
-                                    <p:anim calcmode="lin" valueType="num">
-                                      <p:cBhvr additive="base">
-                                        <p:cTn id="25" dur="500" fill="hold"/>
-                                        <p:tgtEl>
-                                          <p:spTgt spid="7"/>
-                                        </p:tgtEl>
-                                        <p:attrNameLst>
-                                          <p:attrName>ppt_x</p:attrName>
-                                        </p:attrNameLst>
-                                      </p:cBhvr>
-                                      <p:tavLst>
-                                        <p:tav tm="0">
-                                          <p:val>
-                                            <p:strVal val="#ppt_x"/>
-                                          </p:val>
-                                        </p:tav>
-                                        <p:tav tm="100000">
-                                          <p:val>
-                                            <p:strVal val="#ppt_x"/>
-                                          </p:val>
-                                        </p:tav>
-                                      </p:tavLst>
-                                    </p:anim>
-                                    <p:anim calcmode="lin" valueType="num">
-                                      <p:cBhvr additive="base">
-                                        <p:cTn id="26" dur="500" fill="hold"/>
-                                        <p:tgtEl>
-                                          <p:spTgt spid="7"/>
-                                        </p:tgtEl>
-                                        <p:attrNameLst>
-                                          <p:attrName>ppt_y</p:attrName>
-                                        </p:attrNameLst>
-                                      </p:cBhvr>
-                                      <p:tavLst>
-                                        <p:tav tm="0">
-                                          <p:val>
-                                            <p:strVal val="0-#ppt_h/2"/>
-                                          </p:val>
-                                        </p:tav>
-                                        <p:tav tm="100000">
-                                          <p:val>
-                                            <p:strVal val="#ppt_y"/>
-                                          </p:val>
-                                        </p:tav>
-                                      </p:tavLst>
-                                    </p:anim>
-                                  </p:childTnLst>
-                                </p:cTn>
-                              </p:par>
-                              <p:par>
-                                <p:cTn id="27" presetID="2" presetClass="entr" presetSubtype="4" fill="hold" grpId="0" nodeType="withEffect">
-                                  <p:stCondLst>
-                                    <p:cond delay="0"/>
-                                  </p:stCondLst>
-                                  <p:childTnLst>
-                                    <p:set>
-                                      <p:cBhvr>
-                                        <p:cTn id="28" dur="1" fill="hold">
-                                          <p:stCondLst>
-                                            <p:cond delay="0"/>
-                                          </p:stCondLst>
-                                        </p:cTn>
-                                        <p:tgtEl>
-                                          <p:spTgt spid="8"/>
-                                        </p:tgtEl>
-                                        <p:attrNameLst>
-                                          <p:attrName>style.visibility</p:attrName>
-                                        </p:attrNameLst>
-                                      </p:cBhvr>
-                                      <p:to>
-                                        <p:strVal val="visible"/>
-                                      </p:to>
-                                    </p:set>
-                                    <p:anim calcmode="lin" valueType="num">
-                                      <p:cBhvr additive="base">
-                                        <p:cTn id="29" dur="500" fill="hold"/>
-                                        <p:tgtEl>
-                                          <p:spTgt spid="8"/>
-                                        </p:tgtEl>
-                                        <p:attrNameLst>
-                                          <p:attrName>ppt_x</p:attrName>
-                                        </p:attrNameLst>
-                                      </p:cBhvr>
-                                      <p:tavLst>
-                                        <p:tav tm="0">
-                                          <p:val>
-                                            <p:strVal val="#ppt_x"/>
-                                          </p:val>
-                                        </p:tav>
-                                        <p:tav tm="100000">
-                                          <p:val>
-                                            <p:strVal val="#ppt_x"/>
-                                          </p:val>
-                                        </p:tav>
-                                      </p:tavLst>
-                                    </p:anim>
-                                    <p:anim calcmode="lin" valueType="num">
-                                      <p:cBhvr additive="base">
-                                        <p:cTn id="30" dur="500" fill="hold"/>
-                                        <p:tgtEl>
-                                          <p:spTgt spid="8"/>
-                                        </p:tgtEl>
-                                        <p:attrNameLst>
-                                          <p:attrName>ppt_y</p:attrName>
-                                        </p:attrNameLst>
-                                      </p:cBhvr>
-                                      <p:tavLst>
-                                        <p:tav tm="0">
-                                          <p:val>
-                                            <p:strVal val="1+#ppt_h/2"/>
-                                          </p:val>
-                                        </p:tav>
-                                        <p:tav tm="100000">
-                                          <p:val>
-                                            <p:strVal val="#ppt_y"/>
-                                          </p:val>
-                                        </p:tav>
-                                      </p:tavLst>
-                                    </p:anim>
-                                  </p:childTnLst>
-                                </p:cTn>
-                              </p:par>
-                            </p:childTnLst>
-                          </p:cTn>
-                        </p:par>
-                      </p:childTnLst>
-                    </p:cTn>
-                  </p:par>
-                  <p:par>
-                    <p:cTn id="31" fill="hold">
-                      <p:stCondLst>
-                        <p:cond delay="indefinite"/>
-                      </p:stCondLst>
-                      <p:childTnLst>
-                        <p:par>
-                          <p:cTn id="32" fill="hold">
-                            <p:stCondLst>
-                              <p:cond delay="0"/>
-                            </p:stCondLst>
-                            <p:childTnLst>
-                              <p:par>
-                                <p:cTn id="33" presetID="2" presetClass="exit" presetSubtype="4" fill="hold" nodeType="clickEffect">
-                                  <p:stCondLst>
-                                    <p:cond delay="0"/>
-                                  </p:stCondLst>
-                                  <p:childTnLst>
-                                    <p:anim calcmode="lin" valueType="num">
-                                      <p:cBhvr additive="base">
-                                        <p:cTn id="34" dur="500"/>
-                                        <p:tgtEl>
-                                          <p:spTgt spid="7"/>
-                                        </p:tgtEl>
-                                        <p:attrNameLst>
-                                          <p:attrName>ppt_x</p:attrName>
-                                        </p:attrNameLst>
-                                      </p:cBhvr>
-                                      <p:tavLst>
-                                        <p:tav tm="0">
-                                          <p:val>
-                                            <p:strVal val="ppt_x"/>
-                                          </p:val>
-                                        </p:tav>
-                                        <p:tav tm="100000">
-                                          <p:val>
-                                            <p:strVal val="ppt_x"/>
-                                          </p:val>
-                                        </p:tav>
-                                      </p:tavLst>
-                                    </p:anim>
-                                    <p:anim calcmode="lin" valueType="num">
-                                      <p:cBhvr additive="base">
-                                        <p:cTn id="35" dur="500"/>
-                                        <p:tgtEl>
-                                          <p:spTgt spid="7"/>
                                         </p:tgtEl>
                                         <p:attrNameLst>
                                           <p:attrName>ppt_y</p:attrName>
@@ -23065,7 +22511,7 @@
                                           </p:stCondLst>
                                         </p:cTn>
                                         <p:tgtEl>
-                                          <p:spTgt spid="7"/>
+                                          <p:spTgt spid="6"/>
                                         </p:tgtEl>
                                         <p:attrNameLst>
                                           <p:attrName>style.visibility</p:attrName>
@@ -23079,16 +22525,34 @@
                                 </p:cTn>
                               </p:par>
                               <p:par>
-                                <p:cTn id="37" presetID="2" presetClass="exit" presetSubtype="1" fill="hold" grpId="1" nodeType="withEffect">
+                                <p:cTn id="37" presetID="2" presetClass="entr" presetSubtype="1" fill="hold" nodeType="withEffect">
                                   <p:stCondLst>
                                     <p:cond delay="0"/>
                                   </p:stCondLst>
                                   <p:childTnLst>
+                                    <p:set>
+                                      <p:cBhvr>
+                                        <p:cTn id="38" dur="1" fill="hold">
+                                          <p:stCondLst>
+                                            <p:cond delay="0"/>
+                                          </p:stCondLst>
+                                        </p:cTn>
+                                        <p:tgtEl>
+                                          <p:spTgt spid="7"/>
+                                        </p:tgtEl>
+                                        <p:attrNameLst>
+                                          <p:attrName>style.visibility</p:attrName>
+                                        </p:attrNameLst>
+                                      </p:cBhvr>
+                                      <p:to>
+                                        <p:strVal val="visible"/>
+                                      </p:to>
+                                    </p:set>
                                     <p:anim calcmode="lin" valueType="num">
                                       <p:cBhvr additive="base">
-                                        <p:cTn id="38" dur="500"/>
+                                        <p:cTn id="39" dur="500" fill="hold"/>
                                         <p:tgtEl>
-                                          <p:spTgt spid="8"/>
+                                          <p:spTgt spid="7"/>
                                         </p:tgtEl>
                                         <p:attrNameLst>
                                           <p:attrName>ppt_x</p:attrName>
@@ -23097,21 +22561,21 @@
                                       <p:tavLst>
                                         <p:tav tm="0">
                                           <p:val>
-                                            <p:strVal val="ppt_x"/>
+                                            <p:strVal val="#ppt_x"/>
                                           </p:val>
                                         </p:tav>
                                         <p:tav tm="100000">
                                           <p:val>
-                                            <p:strVal val="ppt_x"/>
+                                            <p:strVal val="#ppt_x"/>
                                           </p:val>
                                         </p:tav>
                                       </p:tavLst>
                                     </p:anim>
                                     <p:anim calcmode="lin" valueType="num">
                                       <p:cBhvr additive="base">
-                                        <p:cTn id="39" dur="500"/>
+                                        <p:cTn id="40" dur="500" fill="hold"/>
                                         <p:tgtEl>
-                                          <p:spTgt spid="8"/>
+                                          <p:spTgt spid="7"/>
                                         </p:tgtEl>
                                         <p:attrNameLst>
                                           <p:attrName>ppt_y</p:attrName>
@@ -23120,39 +22584,21 @@
                                       <p:tavLst>
                                         <p:tav tm="0">
                                           <p:val>
-                                            <p:strVal val="ppt_y"/>
+                                            <p:strVal val="0-#ppt_h/2"/>
                                           </p:val>
                                         </p:tav>
                                         <p:tav tm="100000">
                                           <p:val>
-                                            <p:strVal val="0-ppt_h/2"/>
+                                            <p:strVal val="#ppt_y"/>
                                           </p:val>
                                         </p:tav>
                                       </p:tavLst>
                                     </p:anim>
-                                    <p:set>
-                                      <p:cBhvr>
-                                        <p:cTn id="40" dur="1" fill="hold">
-                                          <p:stCondLst>
-                                            <p:cond delay="499"/>
-                                          </p:stCondLst>
-                                        </p:cTn>
-                                        <p:tgtEl>
-                                          <p:spTgt spid="8"/>
-                                        </p:tgtEl>
-                                        <p:attrNameLst>
-                                          <p:attrName>style.visibility</p:attrName>
-                                        </p:attrNameLst>
-                                      </p:cBhvr>
-                                      <p:to>
-                                        <p:strVal val="hidden"/>
-                                      </p:to>
-                                    </p:set>
                                   </p:childTnLst>
                                 </p:cTn>
                               </p:par>
                               <p:par>
-                                <p:cTn id="41" presetID="2" presetClass="entr" presetSubtype="1" fill="hold" grpId="0" nodeType="withEffect">
+                                <p:cTn id="41" presetID="2" presetClass="entr" presetSubtype="4" fill="hold" grpId="0" nodeType="withEffect">
                                   <p:stCondLst>
                                     <p:cond delay="0"/>
                                   </p:stCondLst>
@@ -23165,7 +22611,7 @@
                                           </p:stCondLst>
                                         </p:cTn>
                                         <p:tgtEl>
-                                          <p:spTgt spid="3"/>
+                                          <p:spTgt spid="8"/>
                                         </p:tgtEl>
                                         <p:attrNameLst>
                                           <p:attrName>style.visibility</p:attrName>
@@ -23179,7 +22625,7 @@
                                       <p:cBhvr additive="base">
                                         <p:cTn id="43" dur="500" fill="hold"/>
                                         <p:tgtEl>
-                                          <p:spTgt spid="3"/>
+                                          <p:spTgt spid="8"/>
                                         </p:tgtEl>
                                         <p:attrNameLst>
                                           <p:attrName>ppt_x</p:attrName>
@@ -23202,80 +22648,7 @@
                                       <p:cBhvr additive="base">
                                         <p:cTn id="44" dur="500" fill="hold"/>
                                         <p:tgtEl>
-                                          <p:spTgt spid="3"/>
-                                        </p:tgtEl>
-                                        <p:attrNameLst>
-                                          <p:attrName>ppt_y</p:attrName>
-                                        </p:attrNameLst>
-                                      </p:cBhvr>
-                                      <p:tavLst>
-                                        <p:tav tm="0">
-                                          <p:val>
-                                            <p:strVal val="0-#ppt_h/2"/>
-                                          </p:val>
-                                        </p:tav>
-                                        <p:tav tm="100000">
-                                          <p:val>
-                                            <p:strVal val="#ppt_y"/>
-                                          </p:val>
-                                        </p:tav>
-                                      </p:tavLst>
-                                    </p:anim>
-                                  </p:childTnLst>
-                                </p:cTn>
-                              </p:par>
-                              <p:par>
-                                <p:cTn id="45" presetID="2" presetClass="entr" presetSubtype="4" fill="hold" nodeType="withEffect">
-                                  <p:stCondLst>
-                                    <p:cond delay="0"/>
-                                  </p:stCondLst>
-                                  <p:childTnLst>
-                                    <p:set>
-                                      <p:cBhvr>
-                                        <p:cTn id="46" dur="1" fill="hold">
-                                          <p:stCondLst>
-                                            <p:cond delay="0"/>
-                                          </p:stCondLst>
-                                        </p:cTn>
-                                        <p:tgtEl>
-                                          <p:spTgt spid="1026"/>
-                                        </p:tgtEl>
-                                        <p:attrNameLst>
-                                          <p:attrName>style.visibility</p:attrName>
-                                        </p:attrNameLst>
-                                      </p:cBhvr>
-                                      <p:to>
-                                        <p:strVal val="visible"/>
-                                      </p:to>
-                                    </p:set>
-                                    <p:anim calcmode="lin" valueType="num">
-                                      <p:cBhvr additive="base">
-                                        <p:cTn id="47" dur="500" fill="hold"/>
-                                        <p:tgtEl>
-                                          <p:spTgt spid="1026"/>
-                                        </p:tgtEl>
-                                        <p:attrNameLst>
-                                          <p:attrName>ppt_x</p:attrName>
-                                        </p:attrNameLst>
-                                      </p:cBhvr>
-                                      <p:tavLst>
-                                        <p:tav tm="0">
-                                          <p:val>
-                                            <p:strVal val="#ppt_x"/>
-                                          </p:val>
-                                        </p:tav>
-                                        <p:tav tm="100000">
-                                          <p:val>
-                                            <p:strVal val="#ppt_x"/>
-                                          </p:val>
-                                        </p:tav>
-                                      </p:tavLst>
-                                    </p:anim>
-                                    <p:anim calcmode="lin" valueType="num">
-                                      <p:cBhvr additive="base">
-                                        <p:cTn id="48" dur="500" fill="hold"/>
-                                        <p:tgtEl>
-                                          <p:spTgt spid="1026"/>
+                                          <p:spTgt spid="8"/>
                                         </p:tgtEl>
                                         <p:attrNameLst>
                                           <p:attrName>ppt_y</p:attrName>
@@ -23328,8 +22701,8 @@
       <p:bldP spid="6" grpId="0"/>
       <p:bldP spid="6" grpId="1"/>
       <p:bldP spid="8" grpId="0"/>
-      <p:bldP spid="8" grpId="1"/>
       <p:bldP spid="3" grpId="0"/>
+      <p:bldP spid="3" grpId="1"/>
     </p:bldLst>
   </p:timing>
 </p:sld>
@@ -23357,7 +22730,7 @@
           <p:cNvPr id="2" name="Titre 1">
             <a:extLst>
               <a:ext uri="{FF2B5EF4-FFF2-40B4-BE49-F238E27FC236}">
-                <a16:creationId xmlns:a16="http://schemas.microsoft.com/office/drawing/2014/main" xmlns="" id="{ECC9877D-010A-4AE8-A590-5DB6D61E307D}"/>
+                <a16:creationId xmlns="" xmlns:a16="http://schemas.microsoft.com/office/drawing/2014/main" id="{ECC9877D-010A-4AE8-A590-5DB6D61E307D}"/>
               </a:ext>
             </a:extLst>
           </p:cNvPr>
@@ -23385,7 +22758,7 @@
           <p:cNvPr id="3" name="Espace réservé du contenu 2">
             <a:extLst>
               <a:ext uri="{FF2B5EF4-FFF2-40B4-BE49-F238E27FC236}">
-                <a16:creationId xmlns:a16="http://schemas.microsoft.com/office/drawing/2014/main" xmlns="" id="{77A8E202-94D4-4F1A-AD85-3030F1D0E57A}"/>
+                <a16:creationId xmlns="" xmlns:a16="http://schemas.microsoft.com/office/drawing/2014/main" id="{77A8E202-94D4-4F1A-AD85-3030F1D0E57A}"/>
               </a:ext>
             </a:extLst>
           </p:cNvPr>
@@ -23434,7 +22807,7 @@
           <p:cNvPr id="5" name="ZoneTexte 4">
             <a:extLst>
               <a:ext uri="{FF2B5EF4-FFF2-40B4-BE49-F238E27FC236}">
-                <a16:creationId xmlns:a16="http://schemas.microsoft.com/office/drawing/2014/main" xmlns="" id="{2D737C13-863C-4CEF-B304-BA892E0A1FF9}"/>
+                <a16:creationId xmlns="" xmlns:a16="http://schemas.microsoft.com/office/drawing/2014/main" id="{2D737C13-863C-4CEF-B304-BA892E0A1FF9}"/>
               </a:ext>
             </a:extLst>
           </p:cNvPr>
@@ -23473,7 +22846,7 @@
           <p:cNvPr id="6" name="Image 6">
             <a:extLst>
               <a:ext uri="{FF2B5EF4-FFF2-40B4-BE49-F238E27FC236}">
-                <a16:creationId xmlns:a16="http://schemas.microsoft.com/office/drawing/2014/main" xmlns="" id="{E04BE644-8F9B-4272-8A93-B50D34A61011}"/>
+                <a16:creationId xmlns="" xmlns:a16="http://schemas.microsoft.com/office/drawing/2014/main" id="{E04BE644-8F9B-4272-8A93-B50D34A61011}"/>
               </a:ext>
             </a:extLst>
           </p:cNvPr>
@@ -23503,7 +22876,7 @@
           <p:cNvPr id="7" name="Image 7">
             <a:extLst>
               <a:ext uri="{FF2B5EF4-FFF2-40B4-BE49-F238E27FC236}">
-                <a16:creationId xmlns:a16="http://schemas.microsoft.com/office/drawing/2014/main" xmlns="" id="{C892B35E-1C67-4659-B225-D6AB9DAF6E4B}"/>
+                <a16:creationId xmlns="" xmlns:a16="http://schemas.microsoft.com/office/drawing/2014/main" id="{C892B35E-1C67-4659-B225-D6AB9DAF6E4B}"/>
               </a:ext>
             </a:extLst>
           </p:cNvPr>
@@ -23533,7 +22906,7 @@
           <p:cNvPr id="8" name="Image 8" descr="Une image contenant texte, signe, graphiques vectoriels&#10;&#10;Description générée automatiquement">
             <a:extLst>
               <a:ext uri="{FF2B5EF4-FFF2-40B4-BE49-F238E27FC236}">
-                <a16:creationId xmlns:a16="http://schemas.microsoft.com/office/drawing/2014/main" xmlns="" id="{E9557132-6312-4F21-9089-A0D7F593D91B}"/>
+                <a16:creationId xmlns="" xmlns:a16="http://schemas.microsoft.com/office/drawing/2014/main" id="{E9557132-6312-4F21-9089-A0D7F593D91B}"/>
               </a:ext>
             </a:extLst>
           </p:cNvPr>
@@ -23563,7 +22936,7 @@
           <p:cNvPr id="11" name="ZoneTexte 10">
             <a:extLst>
               <a:ext uri="{FF2B5EF4-FFF2-40B4-BE49-F238E27FC236}">
-                <a16:creationId xmlns:a16="http://schemas.microsoft.com/office/drawing/2014/main" xmlns="" id="{8748C419-7CDE-4BA3-95F2-7CD696F8BACB}"/>
+                <a16:creationId xmlns="" xmlns:a16="http://schemas.microsoft.com/office/drawing/2014/main" id="{8748C419-7CDE-4BA3-95F2-7CD696F8BACB}"/>
               </a:ext>
             </a:extLst>
           </p:cNvPr>
@@ -23729,7 +23102,7 @@
           <p:cNvPr id="12" name="Image 12" descr="Une image contenant texte&#10;&#10;Description générée automatiquement">
             <a:extLst>
               <a:ext uri="{FF2B5EF4-FFF2-40B4-BE49-F238E27FC236}">
-                <a16:creationId xmlns:a16="http://schemas.microsoft.com/office/drawing/2014/main" xmlns="" id="{3072A294-E3E8-451B-B650-508705E5B570}"/>
+                <a16:creationId xmlns="" xmlns:a16="http://schemas.microsoft.com/office/drawing/2014/main" id="{3072A294-E3E8-451B-B650-508705E5B570}"/>
               </a:ext>
             </a:extLst>
           </p:cNvPr>
@@ -24385,7 +23758,7 @@
           <p:cNvPr id="2" name="Titre 1">
             <a:extLst>
               <a:ext uri="{FF2B5EF4-FFF2-40B4-BE49-F238E27FC236}">
-                <a16:creationId xmlns:a16="http://schemas.microsoft.com/office/drawing/2014/main" xmlns="" id="{ECC9877D-010A-4AE8-A590-5DB6D61E307D}"/>
+                <a16:creationId xmlns="" xmlns:a16="http://schemas.microsoft.com/office/drawing/2014/main" id="{ECC9877D-010A-4AE8-A590-5DB6D61E307D}"/>
               </a:ext>
             </a:extLst>
           </p:cNvPr>
@@ -24413,7 +23786,7 @@
           <p:cNvPr id="3" name="Espace réservé du contenu 2">
             <a:extLst>
               <a:ext uri="{FF2B5EF4-FFF2-40B4-BE49-F238E27FC236}">
-                <a16:creationId xmlns:a16="http://schemas.microsoft.com/office/drawing/2014/main" xmlns="" id="{77A8E202-94D4-4F1A-AD85-3030F1D0E57A}"/>
+                <a16:creationId xmlns="" xmlns:a16="http://schemas.microsoft.com/office/drawing/2014/main" id="{77A8E202-94D4-4F1A-AD85-3030F1D0E57A}"/>
               </a:ext>
             </a:extLst>
           </p:cNvPr>
@@ -24450,7 +23823,7 @@
           <p:cNvPr id="5" name="ZoneTexte 4">
             <a:extLst>
               <a:ext uri="{FF2B5EF4-FFF2-40B4-BE49-F238E27FC236}">
-                <a16:creationId xmlns:a16="http://schemas.microsoft.com/office/drawing/2014/main" xmlns="" id="{2D737C13-863C-4CEF-B304-BA892E0A1FF9}"/>
+                <a16:creationId xmlns="" xmlns:a16="http://schemas.microsoft.com/office/drawing/2014/main" id="{2D737C13-863C-4CEF-B304-BA892E0A1FF9}"/>
               </a:ext>
             </a:extLst>
           </p:cNvPr>
@@ -24488,7 +23861,7 @@
           <p:cNvPr id="4" name="Image 5">
             <a:extLst>
               <a:ext uri="{FF2B5EF4-FFF2-40B4-BE49-F238E27FC236}">
-                <a16:creationId xmlns:a16="http://schemas.microsoft.com/office/drawing/2014/main" xmlns="" id="{6C6A984D-A449-4913-9C6A-F11EE37F7487}"/>
+                <a16:creationId xmlns="" xmlns:a16="http://schemas.microsoft.com/office/drawing/2014/main" id="{6C6A984D-A449-4913-9C6A-F11EE37F7487}"/>
               </a:ext>
             </a:extLst>
           </p:cNvPr>
@@ -24518,7 +23891,7 @@
           <p:cNvPr id="7" name="Image 7">
             <a:extLst>
               <a:ext uri="{FF2B5EF4-FFF2-40B4-BE49-F238E27FC236}">
-                <a16:creationId xmlns:a16="http://schemas.microsoft.com/office/drawing/2014/main" xmlns="" id="{6148CDA1-0A44-4888-A282-F62EAAD7CF83}"/>
+                <a16:creationId xmlns="" xmlns:a16="http://schemas.microsoft.com/office/drawing/2014/main" id="{6148CDA1-0A44-4888-A282-F62EAAD7CF83}"/>
               </a:ext>
             </a:extLst>
           </p:cNvPr>
@@ -24548,7 +23921,7 @@
           <p:cNvPr id="9" name="Image 9">
             <a:extLst>
               <a:ext uri="{FF2B5EF4-FFF2-40B4-BE49-F238E27FC236}">
-                <a16:creationId xmlns:a16="http://schemas.microsoft.com/office/drawing/2014/main" xmlns="" id="{EFF148F8-1737-4C7F-B4C9-5BA51A5AD6FF}"/>
+                <a16:creationId xmlns="" xmlns:a16="http://schemas.microsoft.com/office/drawing/2014/main" id="{EFF148F8-1737-4C7F-B4C9-5BA51A5AD6FF}"/>
               </a:ext>
             </a:extLst>
           </p:cNvPr>
@@ -24578,7 +23951,7 @@
           <p:cNvPr id="11" name="Image 11">
             <a:extLst>
               <a:ext uri="{FF2B5EF4-FFF2-40B4-BE49-F238E27FC236}">
-                <a16:creationId xmlns:a16="http://schemas.microsoft.com/office/drawing/2014/main" xmlns="" id="{887E83FB-8EAC-41E4-9212-E35715FA7D87}"/>
+                <a16:creationId xmlns="" xmlns:a16="http://schemas.microsoft.com/office/drawing/2014/main" id="{887E83FB-8EAC-41E4-9212-E35715FA7D87}"/>
               </a:ext>
             </a:extLst>
           </p:cNvPr>
@@ -25120,299 +24493,7 @@
           <p:cNvPr id="2" name="Titre 1">
             <a:extLst>
               <a:ext uri="{FF2B5EF4-FFF2-40B4-BE49-F238E27FC236}">
-                <a16:creationId xmlns:a16="http://schemas.microsoft.com/office/drawing/2014/main" xmlns="" id="{ECC9877D-010A-4AE8-A590-5DB6D61E307D}"/>
-              </a:ext>
-            </a:extLst>
-          </p:cNvPr>
-          <p:cNvSpPr>
-            <a:spLocks noGrp="1"/>
-          </p:cNvSpPr>
-          <p:nvPr>
-            <p:ph type="title"/>
-          </p:nvPr>
-        </p:nvSpPr>
-        <p:spPr/>
-        <p:txBody>
-          <a:bodyPr/>
-          <a:lstStyle/>
-          <a:p>
-            <a:r>
-              <a:rPr lang="fr-FR" dirty="0"/>
-              <a:t>Création du projet</a:t>
-            </a:r>
-          </a:p>
-        </p:txBody>
-      </p:sp>
-      <p:sp>
-        <p:nvSpPr>
-          <p:cNvPr id="4" name="Espace réservé du contenu 3">
-            <a:extLst>
-              <a:ext uri="{FF2B5EF4-FFF2-40B4-BE49-F238E27FC236}">
-                <a16:creationId xmlns:a16="http://schemas.microsoft.com/office/drawing/2014/main" xmlns="" id="{F9878E04-961B-4C30-BAA5-9DC4C319ECA3}"/>
-              </a:ext>
-            </a:extLst>
-          </p:cNvPr>
-          <p:cNvSpPr>
-            <a:spLocks noGrp="1"/>
-          </p:cNvSpPr>
-          <p:nvPr>
-            <p:ph idx="1"/>
-          </p:nvPr>
-        </p:nvSpPr>
-        <p:spPr/>
-        <p:txBody>
-          <a:bodyPr vert="horz" lIns="91440" tIns="45720" rIns="91440" bIns="45720" rtlCol="0" anchor="t">
-            <a:normAutofit/>
-          </a:bodyPr>
-          <a:lstStyle/>
-          <a:p>
-            <a:r>
-              <a:rPr lang="fr-FR" dirty="0"/>
-              <a:t>Initialisation des deux aspects de l'application</a:t>
-            </a:r>
-          </a:p>
-          <a:p>
-            <a:r>
-              <a:rPr lang="fr-FR" dirty="0"/>
-              <a:t>Test de la configuration initiale</a:t>
-            </a:r>
-          </a:p>
-          <a:p>
-            <a:r>
-              <a:rPr lang="fr-FR" dirty="0"/>
-              <a:t>Implémentation des classes métiers</a:t>
-            </a:r>
-          </a:p>
-          <a:p>
-            <a:r>
-              <a:rPr lang="fr-FR" dirty="0"/>
-              <a:t>Déclaration des interfaces</a:t>
-            </a:r>
-          </a:p>
-          <a:p>
-            <a:r>
-              <a:rPr lang="fr-FR" dirty="0"/>
-              <a:t>Initialisation de la BDD</a:t>
-            </a:r>
-          </a:p>
-        </p:txBody>
-      </p:sp>
-      <p:pic>
-        <p:nvPicPr>
-          <p:cNvPr id="11" name="Image 11" descr="Une image contenant texte&#10;&#10;Description générée automatiquement">
-            <a:extLst>
-              <a:ext uri="{FF2B5EF4-FFF2-40B4-BE49-F238E27FC236}">
-                <a16:creationId xmlns:a16="http://schemas.microsoft.com/office/drawing/2014/main" xmlns="" id="{6E8DDA91-079C-4F94-9F26-9256E5732E41}"/>
-              </a:ext>
-            </a:extLst>
-          </p:cNvPr>
-          <p:cNvPicPr>
-            <a:picLocks noChangeAspect="1"/>
-          </p:cNvPicPr>
-          <p:nvPr/>
-        </p:nvPicPr>
-        <p:blipFill>
-          <a:blip r:embed="rId2"/>
-          <a:stretch>
-            <a:fillRect/>
-          </a:stretch>
-        </p:blipFill>
-        <p:spPr>
-          <a:xfrm>
-            <a:off x="7666567" y="873950"/>
-            <a:ext cx="2743200" cy="3543767"/>
-          </a:xfrm>
-          <a:prstGeom prst="rect">
-            <a:avLst/>
-          </a:prstGeom>
-        </p:spPr>
-      </p:pic>
-      <p:pic>
-        <p:nvPicPr>
-          <p:cNvPr id="6" name="Image 10" descr="Une image contenant texte&#10;&#10;Description générée automatiquement">
-            <a:extLst>
-              <a:ext uri="{FF2B5EF4-FFF2-40B4-BE49-F238E27FC236}">
-                <a16:creationId xmlns:a16="http://schemas.microsoft.com/office/drawing/2014/main" xmlns="" id="{F99DB048-5935-498C-AF80-0FDD955B4156}"/>
-              </a:ext>
-            </a:extLst>
-          </p:cNvPr>
-          <p:cNvPicPr>
-            <a:picLocks noChangeAspect="1"/>
-          </p:cNvPicPr>
-          <p:nvPr/>
-        </p:nvPicPr>
-        <p:blipFill>
-          <a:blip r:embed="rId3"/>
-          <a:stretch>
-            <a:fillRect/>
-          </a:stretch>
-        </p:blipFill>
-        <p:spPr>
-          <a:xfrm>
-            <a:off x="9010650" y="3328175"/>
-            <a:ext cx="2743200" cy="3143816"/>
-          </a:xfrm>
-          <a:prstGeom prst="rect">
-            <a:avLst/>
-          </a:prstGeom>
-        </p:spPr>
-      </p:pic>
-    </p:spTree>
-    <p:extLst>
-      <p:ext uri="{BB962C8B-B14F-4D97-AF65-F5344CB8AC3E}">
-        <p14:creationId xmlns:p14="http://schemas.microsoft.com/office/powerpoint/2010/main" val="487814839"/>
-      </p:ext>
-    </p:extLst>
-  </p:cSld>
-  <p:clrMapOvr>
-    <a:masterClrMapping/>
-  </p:clrMapOvr>
-  <p:timing>
-    <p:tnLst>
-      <p:par>
-        <p:cTn id="1" dur="indefinite" restart="never" nodeType="tmRoot">
-          <p:childTnLst>
-            <p:seq concurrent="1" nextAc="seek">
-              <p:cTn id="2" dur="indefinite" nodeType="mainSeq">
-                <p:childTnLst>
-                  <p:par>
-                    <p:cTn id="3" fill="hold">
-                      <p:stCondLst>
-                        <p:cond delay="indefinite"/>
-                      </p:stCondLst>
-                      <p:childTnLst>
-                        <p:par>
-                          <p:cTn id="4" fill="hold">
-                            <p:stCondLst>
-                              <p:cond delay="0"/>
-                            </p:stCondLst>
-                            <p:childTnLst>
-                              <p:par>
-                                <p:cTn id="5" presetID="1" presetClass="entr" presetSubtype="0" fill="hold" nodeType="clickEffect">
-                                  <p:stCondLst>
-                                    <p:cond delay="0"/>
-                                  </p:stCondLst>
-                                  <p:childTnLst>
-                                    <p:set>
-                                      <p:cBhvr>
-                                        <p:cTn id="6" dur="1" fill="hold">
-                                          <p:stCondLst>
-                                            <p:cond delay="0"/>
-                                          </p:stCondLst>
-                                        </p:cTn>
-                                        <p:tgtEl>
-                                          <p:spTgt spid="11"/>
-                                        </p:tgtEl>
-                                        <p:attrNameLst>
-                                          <p:attrName>style.visibility</p:attrName>
-                                        </p:attrNameLst>
-                                      </p:cBhvr>
-                                      <p:to>
-                                        <p:strVal val="visible"/>
-                                      </p:to>
-                                    </p:set>
-                                  </p:childTnLst>
-                                </p:cTn>
-                              </p:par>
-                            </p:childTnLst>
-                          </p:cTn>
-                        </p:par>
-                      </p:childTnLst>
-                    </p:cTn>
-                  </p:par>
-                  <p:par>
-                    <p:cTn id="7" fill="hold">
-                      <p:stCondLst>
-                        <p:cond delay="indefinite"/>
-                      </p:stCondLst>
-                      <p:childTnLst>
-                        <p:par>
-                          <p:cTn id="8" fill="hold">
-                            <p:stCondLst>
-                              <p:cond delay="0"/>
-                            </p:stCondLst>
-                            <p:childTnLst>
-                              <p:par>
-                                <p:cTn id="9" presetID="1" presetClass="entr" presetSubtype="0" fill="hold" nodeType="clickEffect">
-                                  <p:stCondLst>
-                                    <p:cond delay="0"/>
-                                  </p:stCondLst>
-                                  <p:childTnLst>
-                                    <p:set>
-                                      <p:cBhvr>
-                                        <p:cTn id="10" dur="1" fill="hold">
-                                          <p:stCondLst>
-                                            <p:cond delay="0"/>
-                                          </p:stCondLst>
-                                        </p:cTn>
-                                        <p:tgtEl>
-                                          <p:spTgt spid="6"/>
-                                        </p:tgtEl>
-                                        <p:attrNameLst>
-                                          <p:attrName>style.visibility</p:attrName>
-                                        </p:attrNameLst>
-                                      </p:cBhvr>
-                                      <p:to>
-                                        <p:strVal val="visible"/>
-                                      </p:to>
-                                    </p:set>
-                                  </p:childTnLst>
-                                </p:cTn>
-                              </p:par>
-                            </p:childTnLst>
-                          </p:cTn>
-                        </p:par>
-                      </p:childTnLst>
-                    </p:cTn>
-                  </p:par>
-                </p:childTnLst>
-              </p:cTn>
-              <p:prevCondLst>
-                <p:cond evt="onPrev" delay="0">
-                  <p:tgtEl>
-                    <p:sldTgt/>
-                  </p:tgtEl>
-                </p:cond>
-              </p:prevCondLst>
-              <p:nextCondLst>
-                <p:cond evt="onNext" delay="0">
-                  <p:tgtEl>
-                    <p:sldTgt/>
-                  </p:tgtEl>
-                </p:cond>
-              </p:nextCondLst>
-            </p:seq>
-          </p:childTnLst>
-        </p:cTn>
-      </p:par>
-    </p:tnLst>
-  </p:timing>
-</p:sld>
-</file>
-
-<file path=ppt/slides/slide8.xml><?xml version="1.0" encoding="utf-8"?>
-<p:sld xmlns:a="http://schemas.openxmlformats.org/drawingml/2006/main" xmlns:r="http://schemas.openxmlformats.org/officeDocument/2006/relationships" xmlns:p="http://schemas.openxmlformats.org/presentationml/2006/main">
-  <p:cSld>
-    <p:spTree>
-      <p:nvGrpSpPr>
-        <p:cNvPr id="1" name=""/>
-        <p:cNvGrpSpPr/>
-        <p:nvPr/>
-      </p:nvGrpSpPr>
-      <p:grpSpPr>
-        <a:xfrm>
-          <a:off x="0" y="0"/>
-          <a:ext cx="0" cy="0"/>
-          <a:chOff x="0" y="0"/>
-          <a:chExt cx="0" cy="0"/>
-        </a:xfrm>
-      </p:grpSpPr>
-      <p:sp>
-        <p:nvSpPr>
-          <p:cNvPr id="2" name="Titre 1">
-            <a:extLst>
-              <a:ext uri="{FF2B5EF4-FFF2-40B4-BE49-F238E27FC236}">
-                <a16:creationId xmlns:a16="http://schemas.microsoft.com/office/drawing/2014/main" xmlns="" id="{ECC9877D-010A-4AE8-A590-5DB6D61E307D}"/>
+                <a16:creationId xmlns="" xmlns:a16="http://schemas.microsoft.com/office/drawing/2014/main" id="{ECC9877D-010A-4AE8-A590-5DB6D61E307D}"/>
               </a:ext>
             </a:extLst>
           </p:cNvPr>
@@ -25440,7 +24521,7 @@
           <p:cNvPr id="5" name="ZoneTexte 4">
             <a:extLst>
               <a:ext uri="{FF2B5EF4-FFF2-40B4-BE49-F238E27FC236}">
-                <a16:creationId xmlns:a16="http://schemas.microsoft.com/office/drawing/2014/main" xmlns="" id="{2D737C13-863C-4CEF-B304-BA892E0A1FF9}"/>
+                <a16:creationId xmlns="" xmlns:a16="http://schemas.microsoft.com/office/drawing/2014/main" id="{2D737C13-863C-4CEF-B304-BA892E0A1FF9}"/>
               </a:ext>
             </a:extLst>
           </p:cNvPr>
@@ -25478,7 +24559,7 @@
           <p:cNvPr id="7" name="Image 7">
             <a:extLst>
               <a:ext uri="{FF2B5EF4-FFF2-40B4-BE49-F238E27FC236}">
-                <a16:creationId xmlns:a16="http://schemas.microsoft.com/office/drawing/2014/main" xmlns="" id="{18C57199-9DF6-4739-941C-AA5E3C6E1BAC}"/>
+                <a16:creationId xmlns="" xmlns:a16="http://schemas.microsoft.com/office/drawing/2014/main" id="{18C57199-9DF6-4739-941C-AA5E3C6E1BAC}"/>
               </a:ext>
             </a:extLst>
           </p:cNvPr>
@@ -25507,7 +24588,7 @@
           <p:cNvPr id="8" name="Image 8">
             <a:extLst>
               <a:ext uri="{FF2B5EF4-FFF2-40B4-BE49-F238E27FC236}">
-                <a16:creationId xmlns:a16="http://schemas.microsoft.com/office/drawing/2014/main" xmlns="" id="{D47A2619-2CD3-4BB4-98A6-CAC4E55A7959}"/>
+                <a16:creationId xmlns="" xmlns:a16="http://schemas.microsoft.com/office/drawing/2014/main" id="{D47A2619-2CD3-4BB4-98A6-CAC4E55A7959}"/>
               </a:ext>
             </a:extLst>
           </p:cNvPr>
@@ -25537,7 +24618,7 @@
           <p:cNvPr id="9" name="Image 9">
             <a:extLst>
               <a:ext uri="{FF2B5EF4-FFF2-40B4-BE49-F238E27FC236}">
-                <a16:creationId xmlns:a16="http://schemas.microsoft.com/office/drawing/2014/main" xmlns="" id="{AE400BD5-5247-4F37-8026-23830564CFE5}"/>
+                <a16:creationId xmlns="" xmlns:a16="http://schemas.microsoft.com/office/drawing/2014/main" id="{AE400BD5-5247-4F37-8026-23830564CFE5}"/>
               </a:ext>
             </a:extLst>
           </p:cNvPr>
@@ -25567,7 +24648,7 @@
           <p:cNvPr id="10" name="Image 10">
             <a:extLst>
               <a:ext uri="{FF2B5EF4-FFF2-40B4-BE49-F238E27FC236}">
-                <a16:creationId xmlns:a16="http://schemas.microsoft.com/office/drawing/2014/main" xmlns="" id="{05836C93-E4ED-488E-B06B-CDB88008E9C7}"/>
+                <a16:creationId xmlns="" xmlns:a16="http://schemas.microsoft.com/office/drawing/2014/main" id="{05836C93-E4ED-488E-B06B-CDB88008E9C7}"/>
               </a:ext>
             </a:extLst>
           </p:cNvPr>
@@ -25658,6 +24739,47 @@
           <a:xfrm>
             <a:off x="5483050" y="4597624"/>
             <a:ext cx="1432859" cy="1428083"/>
+          </a:xfrm>
+          <a:prstGeom prst="rect">
+            <a:avLst/>
+          </a:prstGeom>
+          <a:noFill/>
+          <a:extLst>
+            <a:ext uri="{909E8E84-426E-40DD-AFC4-6F175D3DCCD1}">
+              <a14:hiddenFill xmlns:a14="http://schemas.microsoft.com/office/drawing/2010/main">
+                <a:solidFill>
+                  <a:srgbClr val="FFFFFF"/>
+                </a:solidFill>
+              </a14:hiddenFill>
+            </a:ext>
+          </a:extLst>
+        </p:spPr>
+      </p:pic>
+      <p:pic>
+        <p:nvPicPr>
+          <p:cNvPr id="1026" name="Picture 2" descr="Adding icon launcher for Postman Native App in Ubuntu"/>
+          <p:cNvPicPr>
+            <a:picLocks noChangeAspect="1" noChangeArrowheads="1"/>
+          </p:cNvPicPr>
+          <p:nvPr/>
+        </p:nvPicPr>
+        <p:blipFill>
+          <a:blip r:embed="rId8">
+            <a:extLst>
+              <a:ext uri="{28A0092B-C50C-407E-A947-70E740481C1C}">
+                <a14:useLocalDpi xmlns:a14="http://schemas.microsoft.com/office/drawing/2010/main" val="0"/>
+              </a:ext>
+            </a:extLst>
+          </a:blip>
+          <a:srcRect/>
+          <a:stretch>
+            <a:fillRect/>
+          </a:stretch>
+        </p:blipFill>
+        <p:spPr bwMode="auto">
+          <a:xfrm>
+            <a:off x="5383209" y="4566954"/>
+            <a:ext cx="1599200" cy="1599200"/>
           </a:xfrm>
           <a:prstGeom prst="rect">
             <a:avLst/>
@@ -26003,7 +25125,7 @@
                                           </p:stCondLst>
                                         </p:cTn>
                                         <p:tgtEl>
-                                          <p:spTgt spid="4100"/>
+                                          <p:spTgt spid="1026"/>
                                         </p:tgtEl>
                                         <p:attrNameLst>
                                           <p:attrName>style.visibility</p:attrName>
@@ -26017,10 +25139,577 @@
                                       <p:cBhvr>
                                         <p:cTn id="28" dur="2000"/>
                                         <p:tgtEl>
+                                          <p:spTgt spid="1026"/>
+                                        </p:tgtEl>
+                                      </p:cBhvr>
+                                    </p:animEffect>
+                                  </p:childTnLst>
+                                </p:cTn>
+                              </p:par>
+                            </p:childTnLst>
+                          </p:cTn>
+                        </p:par>
+                      </p:childTnLst>
+                    </p:cTn>
+                  </p:par>
+                  <p:par>
+                    <p:cTn id="29" fill="hold">
+                      <p:stCondLst>
+                        <p:cond delay="indefinite"/>
+                      </p:stCondLst>
+                      <p:childTnLst>
+                        <p:par>
+                          <p:cTn id="30" fill="hold">
+                            <p:stCondLst>
+                              <p:cond delay="0"/>
+                            </p:stCondLst>
+                            <p:childTnLst>
+                              <p:par>
+                                <p:cTn id="31" presetID="45" presetClass="exit" presetSubtype="0" fill="hold" nodeType="clickEffect">
+                                  <p:stCondLst>
+                                    <p:cond delay="0"/>
+                                  </p:stCondLst>
+                                  <p:childTnLst>
+                                    <p:animEffect transition="out" filter="fade">
+                                      <p:cBhvr>
+                                        <p:cTn id="32" dur="2000"/>
+                                        <p:tgtEl>
+                                          <p:spTgt spid="1026"/>
+                                        </p:tgtEl>
+                                      </p:cBhvr>
+                                    </p:animEffect>
+                                    <p:anim calcmode="lin" valueType="num">
+                                      <p:cBhvr>
+                                        <p:cTn id="33" dur="2000"/>
+                                        <p:tgtEl>
+                                          <p:spTgt spid="1026"/>
+                                        </p:tgtEl>
+                                        <p:attrNameLst>
+                                          <p:attrName>ppt_w</p:attrName>
+                                        </p:attrNameLst>
+                                      </p:cBhvr>
+                                      <p:tavLst>
+                                        <p:tav tm="0">
+                                          <p:val>
+                                            <p:strVal val="ppt_w"/>
+                                          </p:val>
+                                        </p:tav>
+                                        <p:tav tm="5000">
+                                          <p:val>
+                                            <p:strVal val="0.92*ppt_w"/>
+                                          </p:val>
+                                        </p:tav>
+                                        <p:tav tm="10000">
+                                          <p:val>
+                                            <p:strVal val="0.71*ppt_w"/>
+                                          </p:val>
+                                        </p:tav>
+                                        <p:tav tm="15000">
+                                          <p:val>
+                                            <p:strVal val="0.38*ppt_w"/>
+                                          </p:val>
+                                        </p:tav>
+                                        <p:tav tm="20000">
+                                          <p:val>
+                                            <p:fltVal val="0"/>
+                                          </p:val>
+                                        </p:tav>
+                                        <p:tav tm="25000">
+                                          <p:val>
+                                            <p:strVal val="-0.38*ppt_w"/>
+                                          </p:val>
+                                        </p:tav>
+                                        <p:tav tm="30000">
+                                          <p:val>
+                                            <p:strVal val="-0.71*ppt_w"/>
+                                          </p:val>
+                                        </p:tav>
+                                        <p:tav tm="35000">
+                                          <p:val>
+                                            <p:strVal val="-0.92*ppt_w"/>
+                                          </p:val>
+                                        </p:tav>
+                                        <p:tav tm="40000">
+                                          <p:val>
+                                            <p:strVal val="-ppt_w"/>
+                                          </p:val>
+                                        </p:tav>
+                                        <p:tav tm="45000">
+                                          <p:val>
+                                            <p:strVal val="-0.92*ppt_w"/>
+                                          </p:val>
+                                        </p:tav>
+                                        <p:tav tm="50000">
+                                          <p:val>
+                                            <p:strVal val="-0.71*ppt_w"/>
+                                          </p:val>
+                                        </p:tav>
+                                        <p:tav tm="55000">
+                                          <p:val>
+                                            <p:strVal val="-0.38*ppt_w"/>
+                                          </p:val>
+                                        </p:tav>
+                                        <p:tav tm="60000">
+                                          <p:val>
+                                            <p:fltVal val="0"/>
+                                          </p:val>
+                                        </p:tav>
+                                        <p:tav tm="65000">
+                                          <p:val>
+                                            <p:strVal val="0.38*ppt_w"/>
+                                          </p:val>
+                                        </p:tav>
+                                        <p:tav tm="70000">
+                                          <p:val>
+                                            <p:strVal val="0.71*ppt_w"/>
+                                          </p:val>
+                                        </p:tav>
+                                        <p:tav tm="75000">
+                                          <p:val>
+                                            <p:strVal val="0.92*ppt_w"/>
+                                          </p:val>
+                                        </p:tav>
+                                        <p:tav tm="80000">
+                                          <p:val>
+                                            <p:strVal val="ppt_w"/>
+                                          </p:val>
+                                        </p:tav>
+                                        <p:tav tm="85000">
+                                          <p:val>
+                                            <p:strVal val="0.92*ppt_w"/>
+                                          </p:val>
+                                        </p:tav>
+                                        <p:tav tm="90000">
+                                          <p:val>
+                                            <p:strVal val="0.71*ppt_w"/>
+                                          </p:val>
+                                        </p:tav>
+                                        <p:tav tm="95000">
+                                          <p:val>
+                                            <p:strVal val="0.38*ppt_w"/>
+                                          </p:val>
+                                        </p:tav>
+                                        <p:tav tm="100000">
+                                          <p:val>
+                                            <p:fltVal val="0"/>
+                                          </p:val>
+                                        </p:tav>
+                                      </p:tavLst>
+                                    </p:anim>
+                                    <p:anim calcmode="lin" valueType="num">
+                                      <p:cBhvr>
+                                        <p:cTn id="34" dur="2000"/>
+                                        <p:tgtEl>
+                                          <p:spTgt spid="1026"/>
+                                        </p:tgtEl>
+                                        <p:attrNameLst>
+                                          <p:attrName>ppt_h</p:attrName>
+                                        </p:attrNameLst>
+                                      </p:cBhvr>
+                                      <p:tavLst>
+                                        <p:tav tm="0">
+                                          <p:val>
+                                            <p:strVal val="ppt_h"/>
+                                          </p:val>
+                                        </p:tav>
+                                        <p:tav tm="100000">
+                                          <p:val>
+                                            <p:strVal val="ppt_h"/>
+                                          </p:val>
+                                        </p:tav>
+                                      </p:tavLst>
+                                    </p:anim>
+                                    <p:set>
+                                      <p:cBhvr>
+                                        <p:cTn id="35" dur="1" fill="hold">
+                                          <p:stCondLst>
+                                            <p:cond delay="1999"/>
+                                          </p:stCondLst>
+                                        </p:cTn>
+                                        <p:tgtEl>
+                                          <p:spTgt spid="1026"/>
+                                        </p:tgtEl>
+                                        <p:attrNameLst>
+                                          <p:attrName>style.visibility</p:attrName>
+                                        </p:attrNameLst>
+                                      </p:cBhvr>
+                                      <p:to>
+                                        <p:strVal val="hidden"/>
+                                      </p:to>
+                                    </p:set>
+                                  </p:childTnLst>
+                                </p:cTn>
+                              </p:par>
+                              <p:par>
+                                <p:cTn id="36" presetID="45" presetClass="entr" presetSubtype="0" fill="hold" nodeType="withEffect">
+                                  <p:stCondLst>
+                                    <p:cond delay="0"/>
+                                  </p:stCondLst>
+                                  <p:childTnLst>
+                                    <p:set>
+                                      <p:cBhvr>
+                                        <p:cTn id="37" dur="1" fill="hold">
+                                          <p:stCondLst>
+                                            <p:cond delay="0"/>
+                                          </p:stCondLst>
+                                        </p:cTn>
+                                        <p:tgtEl>
+                                          <p:spTgt spid="4100"/>
+                                        </p:tgtEl>
+                                        <p:attrNameLst>
+                                          <p:attrName>style.visibility</p:attrName>
+                                        </p:attrNameLst>
+                                      </p:cBhvr>
+                                      <p:to>
+                                        <p:strVal val="visible"/>
+                                      </p:to>
+                                    </p:set>
+                                    <p:animEffect transition="in" filter="fade">
+                                      <p:cBhvr>
+                                        <p:cTn id="38" dur="2000"/>
+                                        <p:tgtEl>
                                           <p:spTgt spid="4100"/>
                                         </p:tgtEl>
                                       </p:cBhvr>
                                     </p:animEffect>
+                                    <p:anim calcmode="lin" valueType="num">
+                                      <p:cBhvr>
+                                        <p:cTn id="39" dur="2000" fill="hold"/>
+                                        <p:tgtEl>
+                                          <p:spTgt spid="4100"/>
+                                        </p:tgtEl>
+                                        <p:attrNameLst>
+                                          <p:attrName>ppt_w</p:attrName>
+                                        </p:attrNameLst>
+                                      </p:cBhvr>
+                                      <p:tavLst>
+                                        <p:tav tm="0" fmla="#ppt_w*sin(2.5*pi*$)">
+                                          <p:val>
+                                            <p:fltVal val="0"/>
+                                          </p:val>
+                                        </p:tav>
+                                        <p:tav tm="100000">
+                                          <p:val>
+                                            <p:fltVal val="1"/>
+                                          </p:val>
+                                        </p:tav>
+                                      </p:tavLst>
+                                    </p:anim>
+                                    <p:anim calcmode="lin" valueType="num">
+                                      <p:cBhvr>
+                                        <p:cTn id="40" dur="2000" fill="hold"/>
+                                        <p:tgtEl>
+                                          <p:spTgt spid="4100"/>
+                                        </p:tgtEl>
+                                        <p:attrNameLst>
+                                          <p:attrName>ppt_h</p:attrName>
+                                        </p:attrNameLst>
+                                      </p:cBhvr>
+                                      <p:tavLst>
+                                        <p:tav tm="0">
+                                          <p:val>
+                                            <p:strVal val="#ppt_h"/>
+                                          </p:val>
+                                        </p:tav>
+                                        <p:tav tm="100000">
+                                          <p:val>
+                                            <p:strVal val="#ppt_h"/>
+                                          </p:val>
+                                        </p:tav>
+                                      </p:tavLst>
+                                    </p:anim>
+                                  </p:childTnLst>
+                                </p:cTn>
+                              </p:par>
+                            </p:childTnLst>
+                          </p:cTn>
+                        </p:par>
+                      </p:childTnLst>
+                    </p:cTn>
+                  </p:par>
+                </p:childTnLst>
+              </p:cTn>
+              <p:prevCondLst>
+                <p:cond evt="onPrev" delay="0">
+                  <p:tgtEl>
+                    <p:sldTgt/>
+                  </p:tgtEl>
+                </p:cond>
+              </p:prevCondLst>
+              <p:nextCondLst>
+                <p:cond evt="onNext" delay="0">
+                  <p:tgtEl>
+                    <p:sldTgt/>
+                  </p:tgtEl>
+                </p:cond>
+              </p:nextCondLst>
+            </p:seq>
+          </p:childTnLst>
+        </p:cTn>
+      </p:par>
+    </p:tnLst>
+  </p:timing>
+</p:sld>
+</file>
+
+<file path=ppt/slides/slide8.xml><?xml version="1.0" encoding="utf-8"?>
+<p:sld xmlns:a="http://schemas.openxmlformats.org/drawingml/2006/main" xmlns:r="http://schemas.openxmlformats.org/officeDocument/2006/relationships" xmlns:p="http://schemas.openxmlformats.org/presentationml/2006/main">
+  <p:cSld>
+    <p:spTree>
+      <p:nvGrpSpPr>
+        <p:cNvPr id="1" name=""/>
+        <p:cNvGrpSpPr/>
+        <p:nvPr/>
+      </p:nvGrpSpPr>
+      <p:grpSpPr>
+        <a:xfrm>
+          <a:off x="0" y="0"/>
+          <a:ext cx="0" cy="0"/>
+          <a:chOff x="0" y="0"/>
+          <a:chExt cx="0" cy="0"/>
+        </a:xfrm>
+      </p:grpSpPr>
+      <p:sp>
+        <p:nvSpPr>
+          <p:cNvPr id="2" name="Titre 1">
+            <a:extLst>
+              <a:ext uri="{FF2B5EF4-FFF2-40B4-BE49-F238E27FC236}">
+                <a16:creationId xmlns="" xmlns:a16="http://schemas.microsoft.com/office/drawing/2014/main" id="{ECC9877D-010A-4AE8-A590-5DB6D61E307D}"/>
+              </a:ext>
+            </a:extLst>
+          </p:cNvPr>
+          <p:cNvSpPr>
+            <a:spLocks noGrp="1"/>
+          </p:cNvSpPr>
+          <p:nvPr>
+            <p:ph type="title"/>
+          </p:nvPr>
+        </p:nvSpPr>
+        <p:spPr/>
+        <p:txBody>
+          <a:bodyPr/>
+          <a:lstStyle/>
+          <a:p>
+            <a:r>
+              <a:rPr lang="fr-FR" dirty="0"/>
+              <a:t>Création du projet</a:t>
+            </a:r>
+          </a:p>
+        </p:txBody>
+      </p:sp>
+      <p:sp>
+        <p:nvSpPr>
+          <p:cNvPr id="4" name="Espace réservé du contenu 3">
+            <a:extLst>
+              <a:ext uri="{FF2B5EF4-FFF2-40B4-BE49-F238E27FC236}">
+                <a16:creationId xmlns="" xmlns:a16="http://schemas.microsoft.com/office/drawing/2014/main" id="{F9878E04-961B-4C30-BAA5-9DC4C319ECA3}"/>
+              </a:ext>
+            </a:extLst>
+          </p:cNvPr>
+          <p:cNvSpPr>
+            <a:spLocks noGrp="1"/>
+          </p:cNvSpPr>
+          <p:nvPr>
+            <p:ph idx="1"/>
+          </p:nvPr>
+        </p:nvSpPr>
+        <p:spPr/>
+        <p:txBody>
+          <a:bodyPr vert="horz" lIns="91440" tIns="45720" rIns="91440" bIns="45720" rtlCol="0" anchor="t">
+            <a:normAutofit/>
+          </a:bodyPr>
+          <a:lstStyle/>
+          <a:p>
+            <a:r>
+              <a:rPr lang="fr-FR" dirty="0"/>
+              <a:t>Initialisation des deux aspects de l'application</a:t>
+            </a:r>
+          </a:p>
+          <a:p>
+            <a:r>
+              <a:rPr lang="fr-FR" dirty="0"/>
+              <a:t>Test de la configuration initiale</a:t>
+            </a:r>
+          </a:p>
+          <a:p>
+            <a:r>
+              <a:rPr lang="fr-FR" dirty="0"/>
+              <a:t>Implémentation des classes métiers</a:t>
+            </a:r>
+          </a:p>
+          <a:p>
+            <a:r>
+              <a:rPr lang="fr-FR" dirty="0"/>
+              <a:t>Déclaration des interfaces</a:t>
+            </a:r>
+          </a:p>
+          <a:p>
+            <a:r>
+              <a:rPr lang="fr-FR" dirty="0"/>
+              <a:t>Initialisation de la BDD</a:t>
+            </a:r>
+          </a:p>
+        </p:txBody>
+      </p:sp>
+      <p:pic>
+        <p:nvPicPr>
+          <p:cNvPr id="11" name="Image 11" descr="Une image contenant texte&#10;&#10;Description générée automatiquement">
+            <a:extLst>
+              <a:ext uri="{FF2B5EF4-FFF2-40B4-BE49-F238E27FC236}">
+                <a16:creationId xmlns="" xmlns:a16="http://schemas.microsoft.com/office/drawing/2014/main" id="{6E8DDA91-079C-4F94-9F26-9256E5732E41}"/>
+              </a:ext>
+            </a:extLst>
+          </p:cNvPr>
+          <p:cNvPicPr>
+            <a:picLocks noChangeAspect="1"/>
+          </p:cNvPicPr>
+          <p:nvPr/>
+        </p:nvPicPr>
+        <p:blipFill>
+          <a:blip r:embed="rId2"/>
+          <a:stretch>
+            <a:fillRect/>
+          </a:stretch>
+        </p:blipFill>
+        <p:spPr>
+          <a:xfrm>
+            <a:off x="7666567" y="873950"/>
+            <a:ext cx="2743200" cy="3543767"/>
+          </a:xfrm>
+          <a:prstGeom prst="rect">
+            <a:avLst/>
+          </a:prstGeom>
+        </p:spPr>
+      </p:pic>
+      <p:pic>
+        <p:nvPicPr>
+          <p:cNvPr id="6" name="Image 10" descr="Une image contenant texte&#10;&#10;Description générée automatiquement">
+            <a:extLst>
+              <a:ext uri="{FF2B5EF4-FFF2-40B4-BE49-F238E27FC236}">
+                <a16:creationId xmlns="" xmlns:a16="http://schemas.microsoft.com/office/drawing/2014/main" id="{F99DB048-5935-498C-AF80-0FDD955B4156}"/>
+              </a:ext>
+            </a:extLst>
+          </p:cNvPr>
+          <p:cNvPicPr>
+            <a:picLocks noChangeAspect="1"/>
+          </p:cNvPicPr>
+          <p:nvPr/>
+        </p:nvPicPr>
+        <p:blipFill>
+          <a:blip r:embed="rId3"/>
+          <a:stretch>
+            <a:fillRect/>
+          </a:stretch>
+        </p:blipFill>
+        <p:spPr>
+          <a:xfrm>
+            <a:off x="9010650" y="3328175"/>
+            <a:ext cx="2743200" cy="3143816"/>
+          </a:xfrm>
+          <a:prstGeom prst="rect">
+            <a:avLst/>
+          </a:prstGeom>
+        </p:spPr>
+      </p:pic>
+    </p:spTree>
+    <p:extLst>
+      <p:ext uri="{BB962C8B-B14F-4D97-AF65-F5344CB8AC3E}">
+        <p14:creationId xmlns:p14="http://schemas.microsoft.com/office/powerpoint/2010/main" val="487814839"/>
+      </p:ext>
+    </p:extLst>
+  </p:cSld>
+  <p:clrMapOvr>
+    <a:masterClrMapping/>
+  </p:clrMapOvr>
+  <p:timing>
+    <p:tnLst>
+      <p:par>
+        <p:cTn id="1" dur="indefinite" restart="never" nodeType="tmRoot">
+          <p:childTnLst>
+            <p:seq concurrent="1" nextAc="seek">
+              <p:cTn id="2" dur="indefinite" nodeType="mainSeq">
+                <p:childTnLst>
+                  <p:par>
+                    <p:cTn id="3" fill="hold">
+                      <p:stCondLst>
+                        <p:cond delay="indefinite"/>
+                      </p:stCondLst>
+                      <p:childTnLst>
+                        <p:par>
+                          <p:cTn id="4" fill="hold">
+                            <p:stCondLst>
+                              <p:cond delay="0"/>
+                            </p:stCondLst>
+                            <p:childTnLst>
+                              <p:par>
+                                <p:cTn id="5" presetID="1" presetClass="entr" presetSubtype="0" fill="hold" nodeType="clickEffect">
+                                  <p:stCondLst>
+                                    <p:cond delay="0"/>
+                                  </p:stCondLst>
+                                  <p:childTnLst>
+                                    <p:set>
+                                      <p:cBhvr>
+                                        <p:cTn id="6" dur="1" fill="hold">
+                                          <p:stCondLst>
+                                            <p:cond delay="0"/>
+                                          </p:stCondLst>
+                                        </p:cTn>
+                                        <p:tgtEl>
+                                          <p:spTgt spid="11"/>
+                                        </p:tgtEl>
+                                        <p:attrNameLst>
+                                          <p:attrName>style.visibility</p:attrName>
+                                        </p:attrNameLst>
+                                      </p:cBhvr>
+                                      <p:to>
+                                        <p:strVal val="visible"/>
+                                      </p:to>
+                                    </p:set>
+                                  </p:childTnLst>
+                                </p:cTn>
+                              </p:par>
+                            </p:childTnLst>
+                          </p:cTn>
+                        </p:par>
+                      </p:childTnLst>
+                    </p:cTn>
+                  </p:par>
+                  <p:par>
+                    <p:cTn id="7" fill="hold">
+                      <p:stCondLst>
+                        <p:cond delay="indefinite"/>
+                      </p:stCondLst>
+                      <p:childTnLst>
+                        <p:par>
+                          <p:cTn id="8" fill="hold">
+                            <p:stCondLst>
+                              <p:cond delay="0"/>
+                            </p:stCondLst>
+                            <p:childTnLst>
+                              <p:par>
+                                <p:cTn id="9" presetID="1" presetClass="entr" presetSubtype="0" fill="hold" nodeType="clickEffect">
+                                  <p:stCondLst>
+                                    <p:cond delay="0"/>
+                                  </p:stCondLst>
+                                  <p:childTnLst>
+                                    <p:set>
+                                      <p:cBhvr>
+                                        <p:cTn id="10" dur="1" fill="hold">
+                                          <p:stCondLst>
+                                            <p:cond delay="0"/>
+                                          </p:stCondLst>
+                                        </p:cTn>
+                                        <p:tgtEl>
+                                          <p:spTgt spid="6"/>
+                                        </p:tgtEl>
+                                        <p:attrNameLst>
+                                          <p:attrName>style.visibility</p:attrName>
+                                        </p:attrNameLst>
+                                      </p:cBhvr>
+                                      <p:to>
+                                        <p:strVal val="visible"/>
+                                      </p:to>
+                                    </p:set>
                                   </p:childTnLst>
                                 </p:cTn>
                               </p:par>
@@ -26077,7 +25766,7 @@
           <p:cNvPr id="2" name="Titre 1">
             <a:extLst>
               <a:ext uri="{FF2B5EF4-FFF2-40B4-BE49-F238E27FC236}">
-                <a16:creationId xmlns:a16="http://schemas.microsoft.com/office/drawing/2014/main" xmlns="" id="{ECC9877D-010A-4AE8-A590-5DB6D61E307D}"/>
+                <a16:creationId xmlns="" xmlns:a16="http://schemas.microsoft.com/office/drawing/2014/main" id="{ECC9877D-010A-4AE8-A590-5DB6D61E307D}"/>
               </a:ext>
             </a:extLst>
           </p:cNvPr>
@@ -26105,7 +25794,7 @@
           <p:cNvPr id="5" name="ZoneTexte 4">
             <a:extLst>
               <a:ext uri="{FF2B5EF4-FFF2-40B4-BE49-F238E27FC236}">
-                <a16:creationId xmlns:a16="http://schemas.microsoft.com/office/drawing/2014/main" xmlns="" id="{2D737C13-863C-4CEF-B304-BA892E0A1FF9}"/>
+                <a16:creationId xmlns="" xmlns:a16="http://schemas.microsoft.com/office/drawing/2014/main" id="{2D737C13-863C-4CEF-B304-BA892E0A1FF9}"/>
               </a:ext>
             </a:extLst>
           </p:cNvPr>
@@ -26133,15 +25822,11 @@
           <a:p>
             <a:r>
               <a:rPr lang="fr-FR" sz="2500" dirty="0" smtClean="0"/>
-              <a:t>Le</a:t>
+              <a:t>Le côté obscur des jeux, pour se </a:t>
             </a:r>
             <a:r>
               <a:rPr lang="fr-FR" sz="2500" dirty="0" smtClean="0"/>
-              <a:t> côté obscur des jeux, pour se </a:t>
-            </a:r>
-            <a:r>
-              <a:rPr lang="fr-FR" sz="2500" dirty="0" err="1" smtClean="0"/>
-              <a:t>sécutiser</a:t>
+              <a:t>sécuriser</a:t>
             </a:r>
             <a:endParaRPr lang="fr-FR" sz="2500" dirty="0"/>
           </a:p>
@@ -26152,7 +25837,7 @@
           <p:cNvPr id="7" name="ZoneTexte 6">
             <a:extLst>
               <a:ext uri="{FF2B5EF4-FFF2-40B4-BE49-F238E27FC236}">
-                <a16:creationId xmlns:a16="http://schemas.microsoft.com/office/drawing/2014/main" xmlns="" id="{34E89267-F372-4FE1-A9BC-41F7027E8847}"/>
+                <a16:creationId xmlns="" xmlns:a16="http://schemas.microsoft.com/office/drawing/2014/main" id="{34E89267-F372-4FE1-A9BC-41F7027E8847}"/>
               </a:ext>
             </a:extLst>
           </p:cNvPr>
@@ -26251,7 +25936,7 @@
           <p:cNvPr id="10" name="ZoneTexte 9">
             <a:extLst>
               <a:ext uri="{FF2B5EF4-FFF2-40B4-BE49-F238E27FC236}">
-                <a16:creationId xmlns:a16="http://schemas.microsoft.com/office/drawing/2014/main" xmlns="" id="{4431F7B4-68C2-47B1-B09E-FDC66EDAC37D}"/>
+                <a16:creationId xmlns="" xmlns:a16="http://schemas.microsoft.com/office/drawing/2014/main" id="{4431F7B4-68C2-47B1-B09E-FDC66EDAC37D}"/>
               </a:ext>
             </a:extLst>
           </p:cNvPr>
@@ -26349,7 +26034,7 @@
           <p:cNvPr id="16" name="ZoneTexte 15">
             <a:extLst>
               <a:ext uri="{FF2B5EF4-FFF2-40B4-BE49-F238E27FC236}">
-                <a16:creationId xmlns:a16="http://schemas.microsoft.com/office/drawing/2014/main" xmlns="" id="{7E12E709-6E1D-4FEB-A62D-410D36F6EFED}"/>
+                <a16:creationId xmlns="" xmlns:a16="http://schemas.microsoft.com/office/drawing/2014/main" id="{7E12E709-6E1D-4FEB-A62D-410D36F6EFED}"/>
               </a:ext>
             </a:extLst>
           </p:cNvPr>
@@ -26576,7 +26261,7 @@
           <p:cNvPr id="8" name="ZoneTexte 7">
             <a:extLst>
               <a:ext uri="{FF2B5EF4-FFF2-40B4-BE49-F238E27FC236}">
-                <a16:creationId xmlns:a16="http://schemas.microsoft.com/office/drawing/2014/main" xmlns="" id="{D73D629C-1F3D-4328-AA24-529E3D71E1C1}"/>
+                <a16:creationId xmlns="" xmlns:a16="http://schemas.microsoft.com/office/drawing/2014/main" id="{D73D629C-1F3D-4328-AA24-529E3D71E1C1}"/>
               </a:ext>
             </a:extLst>
           </p:cNvPr>
@@ -26626,7 +26311,7 @@
           <p:cNvPr id="15" name="ZoneTexte 14">
             <a:extLst>
               <a:ext uri="{FF2B5EF4-FFF2-40B4-BE49-F238E27FC236}">
-                <a16:creationId xmlns:a16="http://schemas.microsoft.com/office/drawing/2014/main" xmlns="" id="{13AFE647-5641-4FB4-8D28-1BDB1C217555}"/>
+                <a16:creationId xmlns="" xmlns:a16="http://schemas.microsoft.com/office/drawing/2014/main" id="{13AFE647-5641-4FB4-8D28-1BDB1C217555}"/>
               </a:ext>
             </a:extLst>
           </p:cNvPr>
@@ -26709,7 +26394,7 @@
           <p:cNvPr id="64" name="ZoneTexte 63">
             <a:extLst>
               <a:ext uri="{FF2B5EF4-FFF2-40B4-BE49-F238E27FC236}">
-                <a16:creationId xmlns:a16="http://schemas.microsoft.com/office/drawing/2014/main" xmlns="" id="{34E89267-F372-4FE1-A9BC-41F7027E8847}"/>
+                <a16:creationId xmlns="" xmlns:a16="http://schemas.microsoft.com/office/drawing/2014/main" id="{34E89267-F372-4FE1-A9BC-41F7027E8847}"/>
               </a:ext>
             </a:extLst>
           </p:cNvPr>
@@ -26751,7 +26436,7 @@
           <p:cNvPr id="65" name="ZoneTexte 64">
             <a:extLst>
               <a:ext uri="{FF2B5EF4-FFF2-40B4-BE49-F238E27FC236}">
-                <a16:creationId xmlns:a16="http://schemas.microsoft.com/office/drawing/2014/main" xmlns="" id="{34E89267-F372-4FE1-A9BC-41F7027E8847}"/>
+                <a16:creationId xmlns="" xmlns:a16="http://schemas.microsoft.com/office/drawing/2014/main" id="{34E89267-F372-4FE1-A9BC-41F7027E8847}"/>
               </a:ext>
             </a:extLst>
           </p:cNvPr>
@@ -27044,7 +26729,7 @@
           <p:cNvPr id="3" name="ZoneTexte 2">
             <a:extLst>
               <a:ext uri="{FF2B5EF4-FFF2-40B4-BE49-F238E27FC236}">
-                <a16:creationId xmlns:a16="http://schemas.microsoft.com/office/drawing/2014/main" xmlns="" id="{6829C4DF-8079-454C-A81C-182BB22E8F2A}"/>
+                <a16:creationId xmlns="" xmlns:a16="http://schemas.microsoft.com/office/drawing/2014/main" id="{6829C4DF-8079-454C-A81C-182BB22E8F2A}"/>
               </a:ext>
             </a:extLst>
           </p:cNvPr>
@@ -27166,6 +26851,33 @@
                                   </p:childTnLst>
                                 </p:cTn>
                               </p:par>
+                              <p:par>
+                                <p:cTn id="9" presetID="1" presetClass="entr" presetSubtype="0" fill="hold" grpId="0" nodeType="withEffect">
+                                  <p:stCondLst>
+                                    <p:cond delay="0"/>
+                                  </p:stCondLst>
+                                  <p:childTnLst>
+                                    <p:set>
+                                      <p:cBhvr>
+                                        <p:cTn id="10" dur="1" fill="hold">
+                                          <p:stCondLst>
+                                            <p:cond delay="0"/>
+                                          </p:stCondLst>
+                                        </p:cTn>
+                                        <p:tgtEl>
+                                          <p:spTgt spid="7"/>
+                                        </p:tgtEl>
+                                        <p:attrNameLst>
+                                          <p:attrName>style.visibility</p:attrName>
+                                        </p:attrNameLst>
+                                      </p:cBhvr>
+                                      <p:to>
+                                        <p:strVal val="visible"/>
+                                      </p:to>
+                                    </p:set>
+                                  </p:childTnLst>
+                                </p:cTn>
+                              </p:par>
                             </p:childTnLst>
                           </p:cTn>
                         </p:par>
@@ -27173,26 +26885,26 @@
                     </p:cTn>
                   </p:par>
                   <p:par>
-                    <p:cTn id="9" fill="hold">
+                    <p:cTn id="11" fill="hold">
                       <p:stCondLst>
                         <p:cond delay="indefinite"/>
                       </p:stCondLst>
                       <p:childTnLst>
                         <p:par>
-                          <p:cTn id="10" fill="hold">
+                          <p:cTn id="12" fill="hold">
                             <p:stCondLst>
                               <p:cond delay="0"/>
                             </p:stCondLst>
                             <p:childTnLst>
                               <p:par>
-                                <p:cTn id="11" presetID="1" presetClass="entr" presetSubtype="0" fill="hold" grpId="0" nodeType="clickEffect">
+                                <p:cTn id="13" presetID="1" presetClass="entr" presetSubtype="0" fill="hold" grpId="0" nodeType="clickEffect">
                                   <p:stCondLst>
                                     <p:cond delay="0"/>
                                   </p:stCondLst>
                                   <p:childTnLst>
                                     <p:set>
                                       <p:cBhvr>
-                                        <p:cTn id="12" dur="1" fill="hold">
+                                        <p:cTn id="14" dur="1" fill="hold">
                                           <p:stCondLst>
                                             <p:cond delay="0"/>
                                           </p:stCondLst>
@@ -27212,14 +26924,14 @@
                                 </p:cTn>
                               </p:par>
                               <p:par>
-                                <p:cTn id="13" presetID="1" presetClass="entr" presetSubtype="0" fill="hold" grpId="0" nodeType="withEffect">
+                                <p:cTn id="15" presetID="1" presetClass="entr" presetSubtype="0" fill="hold" grpId="0" nodeType="withEffect">
                                   <p:stCondLst>
                                     <p:cond delay="0"/>
                                   </p:stCondLst>
                                   <p:childTnLst>
                                     <p:set>
                                       <p:cBhvr>
-                                        <p:cTn id="14" dur="1" fill="hold">
+                                        <p:cTn id="16" dur="1" fill="hold">
                                           <p:stCondLst>
                                             <p:cond delay="0"/>
                                           </p:stCondLst>
@@ -27245,46 +26957,19 @@
                     </p:cTn>
                   </p:par>
                   <p:par>
-                    <p:cTn id="15" fill="hold">
+                    <p:cTn id="17" fill="hold">
                       <p:stCondLst>
                         <p:cond delay="indefinite"/>
                       </p:stCondLst>
                       <p:childTnLst>
                         <p:par>
-                          <p:cTn id="16" fill="hold">
+                          <p:cTn id="18" fill="hold">
                             <p:stCondLst>
                               <p:cond delay="0"/>
                             </p:stCondLst>
                             <p:childTnLst>
                               <p:par>
-                                <p:cTn id="17" presetID="1" presetClass="entr" presetSubtype="0" fill="hold" nodeType="clickEffect">
-                                  <p:stCondLst>
-                                    <p:cond delay="0"/>
-                                  </p:stCondLst>
-                                  <p:childTnLst>
-                                    <p:set>
-                                      <p:cBhvr>
-                                        <p:cTn id="18" dur="1" fill="hold">
-                                          <p:stCondLst>
-                                            <p:cond delay="0"/>
-                                          </p:stCondLst>
-                                        </p:cTn>
-                                        <p:tgtEl>
-                                          <p:spTgt spid="38"/>
-                                        </p:tgtEl>
-                                        <p:attrNameLst>
-                                          <p:attrName>style.visibility</p:attrName>
-                                        </p:attrNameLst>
-                                      </p:cBhvr>
-                                      <p:to>
-                                        <p:strVal val="visible"/>
-                                      </p:to>
-                                    </p:set>
-                                  </p:childTnLst>
-                                </p:cTn>
-                              </p:par>
-                              <p:par>
-                                <p:cTn id="19" presetID="1" presetClass="entr" presetSubtype="0" fill="hold" grpId="0" nodeType="withEffect">
+                                <p:cTn id="19" presetID="1" presetClass="entr" presetSubtype="0" fill="hold" nodeType="clickEffect">
                                   <p:stCondLst>
                                     <p:cond delay="0"/>
                                   </p:stCondLst>
@@ -27297,7 +26982,7 @@
                                           </p:stCondLst>
                                         </p:cTn>
                                         <p:tgtEl>
-                                          <p:spTgt spid="7"/>
+                                          <p:spTgt spid="38"/>
                                         </p:tgtEl>
                                         <p:attrNameLst>
                                           <p:attrName>style.visibility</p:attrName>
@@ -28842,7 +28527,7 @@
   <a:extraClrSchemeLst/>
   <a:extLst>
     <a:ext uri="{05A4C25C-085E-4340-85A3-A5531E510DB2}">
-      <thm15:themeFamily xmlns:thm15="http://schemas.microsoft.com/office/thememl/2012/main" xmlns="" name="Circuit" id="{0AC2F7E7-15F5-431C-B2A2-456FE929F56C}" vid="{0911B802-464C-4241-8DD9-B60FF88E379F}"/>
+      <thm15:themeFamily xmlns="" xmlns:thm15="http://schemas.microsoft.com/office/thememl/2012/main" name="Circuit" id="{0AC2F7E7-15F5-431C-B2A2-456FE929F56C}" vid="{0911B802-464C-4241-8DD9-B60FF88E379F}"/>
     </a:ext>
   </a:extLst>
 </a:theme>
@@ -29137,7 +28822,7 @@
   <a:extraClrSchemeLst/>
   <a:extLst>
     <a:ext uri="{05A4C25C-085E-4340-85A3-A5531E510DB2}">
-      <thm15:themeFamily xmlns:thm15="http://schemas.microsoft.com/office/thememl/2012/main" xmlns="" name="Office Theme" id="{62F939B6-93AF-4DB8-9C6B-D6C7DFDC589F}" vid="{4A3C46E8-61CC-4603-A589-7422A47A8E4A}"/>
+      <thm15:themeFamily xmlns="" xmlns:thm15="http://schemas.microsoft.com/office/thememl/2012/main" name="Office Theme" id="{62F939B6-93AF-4DB8-9C6B-D6C7DFDC589F}" vid="{4A3C46E8-61CC-4603-A589-7422A47A8E4A}"/>
     </a:ext>
   </a:extLst>
 </a:theme>
@@ -29432,7 +29117,7 @@
   <a:extraClrSchemeLst/>
   <a:extLst>
     <a:ext uri="{05A4C25C-085E-4340-85A3-A5531E510DB2}">
-      <thm15:themeFamily xmlns:thm15="http://schemas.microsoft.com/office/thememl/2012/main" xmlns="" name="Office Theme" id="{62F939B6-93AF-4DB8-9C6B-D6C7DFDC589F}" vid="{4A3C46E8-61CC-4603-A589-7422A47A8E4A}"/>
+      <thm15:themeFamily xmlns="" xmlns:thm15="http://schemas.microsoft.com/office/thememl/2012/main" name="Office Theme" id="{62F939B6-93AF-4DB8-9C6B-D6C7DFDC589F}" vid="{4A3C46E8-61CC-4603-A589-7422A47A8E4A}"/>
     </a:ext>
   </a:extLst>
 </a:theme>

</xml_diff>